<commit_message>
Pushed slides into power point
</commit_message>
<xml_diff>
--- a/Jenae/Project 3 - California Hospital Performance Comparison.pptx
+++ b/Jenae/Project 3 - California Hospital Performance Comparison.pptx
@@ -5,7 +5,7 @@
     <p:sldMasterId id="2147483677" r:id="rId1"/>
   </p:sldMasterIdLst>
   <p:notesMasterIdLst>
-    <p:notesMasterId r:id="rId14"/>
+    <p:notesMasterId r:id="rId16"/>
   </p:notesMasterIdLst>
   <p:sldIdLst>
     <p:sldId id="256" r:id="rId2"/>
@@ -14,12 +14,14 @@
     <p:sldId id="265" r:id="rId5"/>
     <p:sldId id="267" r:id="rId6"/>
     <p:sldId id="257" r:id="rId7"/>
-    <p:sldId id="260" r:id="rId8"/>
-    <p:sldId id="264" r:id="rId9"/>
-    <p:sldId id="261" r:id="rId10"/>
-    <p:sldId id="259" r:id="rId11"/>
-    <p:sldId id="268" r:id="rId12"/>
-    <p:sldId id="262" r:id="rId13"/>
+    <p:sldId id="269" r:id="rId8"/>
+    <p:sldId id="270" r:id="rId9"/>
+    <p:sldId id="260" r:id="rId10"/>
+    <p:sldId id="264" r:id="rId11"/>
+    <p:sldId id="261" r:id="rId12"/>
+    <p:sldId id="259" r:id="rId13"/>
+    <p:sldId id="268" r:id="rId14"/>
+    <p:sldId id="262" r:id="rId15"/>
   </p:sldIdLst>
   <p:sldSz cx="12192000" cy="6858000"/>
   <p:notesSz cx="6858000" cy="9144000"/>
@@ -1647,12 +1649,8 @@
             </a:lnSpc>
           </a:pPr>
           <a:r>
-            <a:rPr lang="en-US" b="0" i="0" dirty="0" smtClean="0"/>
-            <a:t>PURPOSE: For </a:t>
-          </a:r>
-          <a:r>
             <a:rPr lang="en-US" b="0" i="0" dirty="0"/>
-            <a:t>this project, our goal was to build an insightful dashboard including key data </a:t>
+            <a:t>PURPOSE: For this project, our goal was to build an insightful dashboard including key data </a:t>
           </a:r>
           <a:r>
             <a:rPr lang="en-US" dirty="0"/>
@@ -1701,12 +1699,8 @@
             </a:lnSpc>
           </a:pPr>
           <a:r>
-            <a:rPr lang="en-US" b="0" i="0" dirty="0" smtClean="0"/>
-            <a:t>KEY OBJECTIVE: By </a:t>
-          </a:r>
-          <a:r>
             <a:rPr lang="en-US" b="0" i="0" dirty="0"/>
-            <a:t>analyzing and visualizing the revenue mix and types of care provided at each hospital, the user can uncover trends and insights about the current healthcare system operations in California.</a:t>
+            <a:t>KEY OBJECTIVE: By analyzing and visualizing the revenue mix and types of care provided at each hospital, the user can uncover trends and insights about the current healthcare system operations in California.</a:t>
           </a:r>
           <a:endParaRPr lang="en-US" dirty="0"/>
         </a:p>
@@ -1788,13 +1782,6 @@
         </dgm:presLayoutVars>
       </dgm:prSet>
       <dgm:spPr/>
-      <dgm:t>
-        <a:bodyPr/>
-        <a:lstStyle/>
-        <a:p>
-          <a:endParaRPr lang="en-US"/>
-        </a:p>
-      </dgm:t>
     </dgm:pt>
     <dgm:pt modelId="{0EE13416-1A0A-4BE7-AF38-309CCD9FCDDA}" type="pres">
       <dgm:prSet presAssocID="{D4DCD722-4182-4E38-852D-DC8181A21CBC}" presName="compNode" presStyleCnt="0"/>
@@ -1803,13 +1790,6 @@
     <dgm:pt modelId="{0A3EB985-0886-4635-A463-46277A5E572D}" type="pres">
       <dgm:prSet presAssocID="{D4DCD722-4182-4E38-852D-DC8181A21CBC}" presName="bgRect" presStyleLbl="bgShp" presStyleIdx="0" presStyleCnt="3"/>
       <dgm:spPr/>
-      <dgm:t>
-        <a:bodyPr/>
-        <a:lstStyle/>
-        <a:p>
-          <a:endParaRPr lang="en-US"/>
-        </a:p>
-      </dgm:t>
     </dgm:pt>
     <dgm:pt modelId="{F183BD5F-A441-429E-B298-F85C7FD9A97D}" type="pres">
       <dgm:prSet presAssocID="{D4DCD722-4182-4E38-852D-DC8181A21CBC}" presName="iconRect" presStyleLbl="node1" presStyleIdx="0" presStyleCnt="3"/>
@@ -1821,7 +1801,7 @@
                 <a14:useLocalDpi xmlns:a14="http://schemas.microsoft.com/office/drawing/2010/main" val="0"/>
               </a:ext>
               <a:ext uri="{96DAC541-7B7A-43D3-8B79-37D633B846F1}">
-                <asvg:svgBlip xmlns:asvg="http://schemas.microsoft.com/office/drawing/2016/SVG/main" xmlns="" r:embed="rId2"/>
+                <asvg:svgBlip xmlns:asvg="http://schemas.microsoft.com/office/drawing/2016/SVG/main" r:embed="rId2"/>
               </a:ext>
             </a:extLst>
           </a:blip>
@@ -1830,13 +1810,6 @@
           </a:stretch>
         </a:blipFill>
       </dgm:spPr>
-      <dgm:t>
-        <a:bodyPr/>
-        <a:lstStyle/>
-        <a:p>
-          <a:endParaRPr lang="en-US"/>
-        </a:p>
-      </dgm:t>
       <dgm:extLst>
         <a:ext uri="{E40237B7-FDA0-4F09-8148-C483321AD2D9}">
           <dgm14:cNvPr xmlns:dgm14="http://schemas.microsoft.com/office/drawing/2010/diagram" id="0" name="" descr="Statistics"/>
@@ -1855,13 +1828,6 @@
         </dgm:presLayoutVars>
       </dgm:prSet>
       <dgm:spPr/>
-      <dgm:t>
-        <a:bodyPr/>
-        <a:lstStyle/>
-        <a:p>
-          <a:endParaRPr lang="en-US"/>
-        </a:p>
-      </dgm:t>
     </dgm:pt>
     <dgm:pt modelId="{BD7FBB69-4D45-4015-8D5D-81E3B0A4907F}" type="pres">
       <dgm:prSet presAssocID="{CE7F95AC-4DE3-42AA-A71F-4EDF665F3304}" presName="sibTrans" presStyleCnt="0"/>
@@ -1874,13 +1840,6 @@
     <dgm:pt modelId="{CA57E06E-F102-47CB-91F2-161FB7AE1ABB}" type="pres">
       <dgm:prSet presAssocID="{0B3256F4-2EE4-4858-80E3-84F16D18622C}" presName="bgRect" presStyleLbl="bgShp" presStyleIdx="1" presStyleCnt="3"/>
       <dgm:spPr/>
-      <dgm:t>
-        <a:bodyPr/>
-        <a:lstStyle/>
-        <a:p>
-          <a:endParaRPr lang="en-US"/>
-        </a:p>
-      </dgm:t>
     </dgm:pt>
     <dgm:pt modelId="{9A3EFD32-1706-494B-BC41-B873B0873934}" type="pres">
       <dgm:prSet presAssocID="{0B3256F4-2EE4-4858-80E3-84F16D18622C}" presName="iconRect" presStyleLbl="node1" presStyleIdx="1" presStyleCnt="3"/>
@@ -1892,7 +1851,7 @@
                 <a14:useLocalDpi xmlns:a14="http://schemas.microsoft.com/office/drawing/2010/main" val="0"/>
               </a:ext>
               <a:ext uri="{96DAC541-7B7A-43D3-8B79-37D633B846F1}">
-                <asvg:svgBlip xmlns:asvg="http://schemas.microsoft.com/office/drawing/2016/SVG/main" xmlns="" r:embed="rId4"/>
+                <asvg:svgBlip xmlns:asvg="http://schemas.microsoft.com/office/drawing/2016/SVG/main" r:embed="rId4"/>
               </a:ext>
             </a:extLst>
           </a:blip>
@@ -1901,13 +1860,6 @@
           </a:stretch>
         </a:blipFill>
       </dgm:spPr>
-      <dgm:t>
-        <a:bodyPr/>
-        <a:lstStyle/>
-        <a:p>
-          <a:endParaRPr lang="en-US"/>
-        </a:p>
-      </dgm:t>
       <dgm:extLst>
         <a:ext uri="{E40237B7-FDA0-4F09-8148-C483321AD2D9}">
           <dgm14:cNvPr xmlns:dgm14="http://schemas.microsoft.com/office/drawing/2010/diagram" id="0" name="" descr="Doctor"/>
@@ -1926,13 +1878,6 @@
         </dgm:presLayoutVars>
       </dgm:prSet>
       <dgm:spPr/>
-      <dgm:t>
-        <a:bodyPr/>
-        <a:lstStyle/>
-        <a:p>
-          <a:endParaRPr lang="en-US"/>
-        </a:p>
-      </dgm:t>
     </dgm:pt>
     <dgm:pt modelId="{7D88DFF1-C999-4C81-9ECD-BC354B74357A}" type="pres">
       <dgm:prSet presAssocID="{45583C0E-4EAA-4FEA-BA94-8ED643336921}" presName="sibTrans" presStyleCnt="0"/>
@@ -1953,7 +1898,7 @@
           <a:blip xmlns:r="http://schemas.openxmlformats.org/officeDocument/2006/relationships" r:embed="rId5">
             <a:extLst>
               <a:ext uri="{96DAC541-7B7A-43D3-8B79-37D633B846F1}">
-                <asvg:svgBlip xmlns:asvg="http://schemas.microsoft.com/office/drawing/2016/SVG/main" xmlns="" r:embed="rId6"/>
+                <asvg:svgBlip xmlns:asvg="http://schemas.microsoft.com/office/drawing/2016/SVG/main" r:embed="rId6"/>
               </a:ext>
             </a:extLst>
           </a:blip>
@@ -1981,22 +1926,15 @@
         </dgm:presLayoutVars>
       </dgm:prSet>
       <dgm:spPr/>
-      <dgm:t>
-        <a:bodyPr/>
-        <a:lstStyle/>
-        <a:p>
-          <a:endParaRPr lang="en-US"/>
-        </a:p>
-      </dgm:t>
     </dgm:pt>
   </dgm:ptLst>
   <dgm:cxnLst>
     <dgm:cxn modelId="{470D943C-5DDC-4478-988D-49D8C0D9E44E}" type="presOf" srcId="{0B3256F4-2EE4-4858-80E3-84F16D18622C}" destId="{D995DAC8-92E1-4180-AFDA-BB26B85D3133}" srcOrd="0" destOrd="0" presId="urn:microsoft.com/office/officeart/2018/2/layout/IconVerticalSolidList"/>
+    <dgm:cxn modelId="{B68B9450-40E7-48AA-9837-08049450DDDC}" srcId="{5648D7A0-9D49-433C-A116-96E67296EEF4}" destId="{0B3256F4-2EE4-4858-80E3-84F16D18622C}" srcOrd="1" destOrd="0" parTransId="{3BEA5680-58EA-4B61-8854-C59850564086}" sibTransId="{45583C0E-4EAA-4FEA-BA94-8ED643336921}"/>
     <dgm:cxn modelId="{0556319D-B5E2-4E45-A39D-5B10A23FB278}" srcId="{5648D7A0-9D49-433C-A116-96E67296EEF4}" destId="{14E98AC5-9129-4BD1-A72E-62E664F8FFA8}" srcOrd="2" destOrd="0" parTransId="{43A129E9-1BA2-474E-86AA-CA9D35E2DF14}" sibTransId="{9B823D46-1E20-4844-8DE6-A19BA5D2A60E}"/>
+    <dgm:cxn modelId="{261C6FA6-55E9-4FD4-96E8-A057EC43B289}" type="presOf" srcId="{5648D7A0-9D49-433C-A116-96E67296EEF4}" destId="{59DE5CAA-2CAD-43E8-B0AF-7AF32D86B08A}" srcOrd="0" destOrd="0" presId="urn:microsoft.com/office/officeart/2018/2/layout/IconVerticalSolidList"/>
     <dgm:cxn modelId="{895D04B1-E1B1-46C0-A3EF-7A18399512F6}" type="presOf" srcId="{D4DCD722-4182-4E38-852D-DC8181A21CBC}" destId="{1AB80843-C108-47B6-98BC-B034661C3C04}" srcOrd="0" destOrd="0" presId="urn:microsoft.com/office/officeart/2018/2/layout/IconVerticalSolidList"/>
-    <dgm:cxn modelId="{261C6FA6-55E9-4FD4-96E8-A057EC43B289}" type="presOf" srcId="{5648D7A0-9D49-433C-A116-96E67296EEF4}" destId="{59DE5CAA-2CAD-43E8-B0AF-7AF32D86B08A}" srcOrd="0" destOrd="0" presId="urn:microsoft.com/office/officeart/2018/2/layout/IconVerticalSolidList"/>
     <dgm:cxn modelId="{63D101CE-514D-4E76-AE58-DDAE2C5E8617}" srcId="{5648D7A0-9D49-433C-A116-96E67296EEF4}" destId="{D4DCD722-4182-4E38-852D-DC8181A21CBC}" srcOrd="0" destOrd="0" parTransId="{70F3084D-7E3E-4101-91CB-2B5DCE0EDBB7}" sibTransId="{CE7F95AC-4DE3-42AA-A71F-4EDF665F3304}"/>
-    <dgm:cxn modelId="{B68B9450-40E7-48AA-9837-08049450DDDC}" srcId="{5648D7A0-9D49-433C-A116-96E67296EEF4}" destId="{0B3256F4-2EE4-4858-80E3-84F16D18622C}" srcOrd="1" destOrd="0" parTransId="{3BEA5680-58EA-4B61-8854-C59850564086}" sibTransId="{45583C0E-4EAA-4FEA-BA94-8ED643336921}"/>
     <dgm:cxn modelId="{CCC103E3-C135-4C73-BAFC-EB684CD17B23}" type="presOf" srcId="{14E98AC5-9129-4BD1-A72E-62E664F8FFA8}" destId="{AFBBA951-EA0F-4FEA-873D-D7F4CE07E77E}" srcOrd="0" destOrd="0" presId="urn:microsoft.com/office/officeart/2018/2/layout/IconVerticalSolidList"/>
     <dgm:cxn modelId="{F8688E0B-5331-47AD-926B-44A482F56D07}" type="presParOf" srcId="{59DE5CAA-2CAD-43E8-B0AF-7AF32D86B08A}" destId="{0EE13416-1A0A-4BE7-AF38-309CCD9FCDDA}" srcOrd="0" destOrd="0" presId="urn:microsoft.com/office/officeart/2018/2/layout/IconVerticalSolidList"/>
     <dgm:cxn modelId="{A2B80D35-7A5D-40A7-987D-E31AF9FB9D5E}" type="presParOf" srcId="{0EE13416-1A0A-4BE7-AF38-309CCD9FCDDA}" destId="{0A3EB985-0886-4635-A463-46277A5E572D}" srcOrd="0" destOrd="0" presId="urn:microsoft.com/office/officeart/2018/2/layout/IconVerticalSolidList"/>
@@ -2054,15 +1992,7 @@
           </a:pPr>
           <a:r>
             <a:rPr lang="en-US" dirty="0"/>
-            <a:t>9 </a:t>
-          </a:r>
-          <a:r>
-            <a:rPr lang="en-US" dirty="0" smtClean="0"/>
-            <a:t>Payer </a:t>
-          </a:r>
-          <a:r>
-            <a:rPr lang="en-US" dirty="0"/>
-            <a:t>Categories</a:t>
+            <a:t>9 Payer Categories</a:t>
           </a:r>
         </a:p>
       </dgm:t>
@@ -2103,13 +2033,8 @@
           </a:pPr>
           <a:r>
             <a:rPr lang="en-US" dirty="0"/>
-            <a:t>431 </a:t>
+            <a:t>431 Hospitals</a:t>
           </a:r>
-          <a:r>
-            <a:rPr lang="en-US" dirty="0" smtClean="0"/>
-            <a:t>Hospitals</a:t>
-          </a:r>
-          <a:endParaRPr lang="en-US" dirty="0"/>
         </a:p>
       </dgm:t>
     </dgm:pt>
@@ -2184,13 +2109,6 @@
         </dgm:presLayoutVars>
       </dgm:prSet>
       <dgm:spPr/>
-      <dgm:t>
-        <a:bodyPr/>
-        <a:lstStyle/>
-        <a:p>
-          <a:endParaRPr lang="en-US"/>
-        </a:p>
-      </dgm:t>
     </dgm:pt>
     <dgm:pt modelId="{501497E0-294A-49C5-89D2-C909FA231A6F}" type="pres">
       <dgm:prSet presAssocID="{CD05649B-8C74-4D5B-9E3F-2478BA58C891}" presName="compNode" presStyleCnt="0"/>
@@ -2203,7 +2121,7 @@
           <a:blip xmlns:r="http://schemas.openxmlformats.org/officeDocument/2006/relationships" r:embed="rId1">
             <a:extLst>
               <a:ext uri="{96DAC541-7B7A-43D3-8B79-37D633B846F1}">
-                <asvg:svgBlip xmlns:asvg="http://schemas.microsoft.com/office/drawing/2016/SVG/main" xmlns="" r:embed="rId2"/>
+                <asvg:svgBlip xmlns:asvg="http://schemas.microsoft.com/office/drawing/2016/SVG/main" r:embed="rId2"/>
               </a:ext>
             </a:extLst>
           </a:blip>
@@ -2231,13 +2149,6 @@
         </dgm:presLayoutVars>
       </dgm:prSet>
       <dgm:spPr/>
-      <dgm:t>
-        <a:bodyPr/>
-        <a:lstStyle/>
-        <a:p>
-          <a:endParaRPr lang="en-US"/>
-        </a:p>
-      </dgm:t>
     </dgm:pt>
     <dgm:pt modelId="{CD6BAFD9-E5DA-4F17-9A84-4AD1A3A70EE8}" type="pres">
       <dgm:prSet presAssocID="{F50EEB1D-DA31-4ED6-9E63-43C83A8075FF}" presName="sibTrans" presStyleCnt="0"/>
@@ -2254,7 +2165,7 @@
           <a:blip xmlns:r="http://schemas.openxmlformats.org/officeDocument/2006/relationships" r:embed="rId3">
             <a:extLst>
               <a:ext uri="{96DAC541-7B7A-43D3-8B79-37D633B846F1}">
-                <asvg:svgBlip xmlns:asvg="http://schemas.microsoft.com/office/drawing/2016/SVG/main" xmlns="" r:embed="rId4"/>
+                <asvg:svgBlip xmlns:asvg="http://schemas.microsoft.com/office/drawing/2016/SVG/main" r:embed="rId4"/>
               </a:ext>
             </a:extLst>
           </a:blip>
@@ -2282,13 +2193,6 @@
         </dgm:presLayoutVars>
       </dgm:prSet>
       <dgm:spPr/>
-      <dgm:t>
-        <a:bodyPr/>
-        <a:lstStyle/>
-        <a:p>
-          <a:endParaRPr lang="en-US"/>
-        </a:p>
-      </dgm:t>
     </dgm:pt>
     <dgm:pt modelId="{BE27F95E-0DD7-4F3D-A58D-41C81F6498EB}" type="pres">
       <dgm:prSet presAssocID="{C817E149-F3C7-4452-A6F4-665D49D13D94}" presName="sibTrans" presStyleCnt="0"/>
@@ -2305,7 +2209,7 @@
           <a:blip xmlns:r="http://schemas.openxmlformats.org/officeDocument/2006/relationships" r:embed="rId5">
             <a:extLst>
               <a:ext uri="{96DAC541-7B7A-43D3-8B79-37D633B846F1}">
-                <asvg:svgBlip xmlns:asvg="http://schemas.microsoft.com/office/drawing/2016/SVG/main" xmlns="" r:embed="rId6"/>
+                <asvg:svgBlip xmlns:asvg="http://schemas.microsoft.com/office/drawing/2016/SVG/main" r:embed="rId6"/>
               </a:ext>
             </a:extLst>
           </a:blip>
@@ -2333,23 +2237,16 @@
         </dgm:presLayoutVars>
       </dgm:prSet>
       <dgm:spPr/>
-      <dgm:t>
-        <a:bodyPr/>
-        <a:lstStyle/>
-        <a:p>
-          <a:endParaRPr lang="en-US"/>
-        </a:p>
-      </dgm:t>
     </dgm:pt>
   </dgm:ptLst>
   <dgm:cxnLst>
-    <dgm:cxn modelId="{D15B439E-E938-4B2A-AB33-A7F61597D7F3}" type="presOf" srcId="{CD05649B-8C74-4D5B-9E3F-2478BA58C891}" destId="{CC1A6799-D267-4FCD-8D98-2D457C544FFD}" srcOrd="0" destOrd="0" presId="urn:microsoft.com/office/officeart/2018/2/layout/IconLabelList"/>
-    <dgm:cxn modelId="{7E345779-6A52-41EE-AC5F-761A4B01613E}" srcId="{B921DA41-0734-4180-A0B6-1C7C30DED0D5}" destId="{6F563EB3-AEFF-427A-89EC-D5F54DE0D1CE}" srcOrd="1" destOrd="0" parTransId="{A1E92C1C-02F9-4AD1-9C19-4D29BA0FC418}" sibTransId="{C817E149-F3C7-4452-A6F4-665D49D13D94}"/>
     <dgm:cxn modelId="{BFAEE101-1639-4670-8CF2-DE8BE8EB4188}" srcId="{B921DA41-0734-4180-A0B6-1C7C30DED0D5}" destId="{BE1D28A6-BC45-4632-BBC7-A7A1D6E10743}" srcOrd="2" destOrd="0" parTransId="{50FD35C8-F98E-4C15-9915-440B107ADE43}" sibTransId="{1DF6F867-E370-44B3-96D9-4D831F312971}"/>
-    <dgm:cxn modelId="{1680D877-6EE7-4669-A372-0F398F999849}" srcId="{B921DA41-0734-4180-A0B6-1C7C30DED0D5}" destId="{CD05649B-8C74-4D5B-9E3F-2478BA58C891}" srcOrd="0" destOrd="0" parTransId="{D80FF642-D437-4291-BAD2-8325AA4D3F91}" sibTransId="{F50EEB1D-DA31-4ED6-9E63-43C83A8075FF}"/>
-    <dgm:cxn modelId="{D740EBFB-6A3D-4AD9-92E7-FB65DBCB4042}" type="presOf" srcId="{6F563EB3-AEFF-427A-89EC-D5F54DE0D1CE}" destId="{6D8C13C9-D2B6-41FD-949D-ED6966756D3F}" srcOrd="0" destOrd="0" presId="urn:microsoft.com/office/officeart/2018/2/layout/IconLabelList"/>
     <dgm:cxn modelId="{8A96CC04-928E-4780-A7AA-8D92B0763C41}" type="presOf" srcId="{BE1D28A6-BC45-4632-BBC7-A7A1D6E10743}" destId="{39863B24-82F4-4CA6-9BDD-CD3F63E41161}" srcOrd="0" destOrd="0" presId="urn:microsoft.com/office/officeart/2018/2/layout/IconLabelList"/>
     <dgm:cxn modelId="{8F1AE952-3587-42BE-AB67-0105F4820479}" type="presOf" srcId="{B921DA41-0734-4180-A0B6-1C7C30DED0D5}" destId="{18CBCA29-BA31-47DE-8C33-F0613E7E4EB0}" srcOrd="0" destOrd="0" presId="urn:microsoft.com/office/officeart/2018/2/layout/IconLabelList"/>
+    <dgm:cxn modelId="{1680D877-6EE7-4669-A372-0F398F999849}" srcId="{B921DA41-0734-4180-A0B6-1C7C30DED0D5}" destId="{CD05649B-8C74-4D5B-9E3F-2478BA58C891}" srcOrd="0" destOrd="0" parTransId="{D80FF642-D437-4291-BAD2-8325AA4D3F91}" sibTransId="{F50EEB1D-DA31-4ED6-9E63-43C83A8075FF}"/>
+    <dgm:cxn modelId="{7E345779-6A52-41EE-AC5F-761A4B01613E}" srcId="{B921DA41-0734-4180-A0B6-1C7C30DED0D5}" destId="{6F563EB3-AEFF-427A-89EC-D5F54DE0D1CE}" srcOrd="1" destOrd="0" parTransId="{A1E92C1C-02F9-4AD1-9C19-4D29BA0FC418}" sibTransId="{C817E149-F3C7-4452-A6F4-665D49D13D94}"/>
+    <dgm:cxn modelId="{D15B439E-E938-4B2A-AB33-A7F61597D7F3}" type="presOf" srcId="{CD05649B-8C74-4D5B-9E3F-2478BA58C891}" destId="{CC1A6799-D267-4FCD-8D98-2D457C544FFD}" srcOrd="0" destOrd="0" presId="urn:microsoft.com/office/officeart/2018/2/layout/IconLabelList"/>
+    <dgm:cxn modelId="{D740EBFB-6A3D-4AD9-92E7-FB65DBCB4042}" type="presOf" srcId="{6F563EB3-AEFF-427A-89EC-D5F54DE0D1CE}" destId="{6D8C13C9-D2B6-41FD-949D-ED6966756D3F}" srcOrd="0" destOrd="0" presId="urn:microsoft.com/office/officeart/2018/2/layout/IconLabelList"/>
     <dgm:cxn modelId="{CC638B33-FBA5-4178-B6D2-76C7DD3D0E65}" type="presParOf" srcId="{18CBCA29-BA31-47DE-8C33-F0613E7E4EB0}" destId="{501497E0-294A-49C5-89D2-C909FA231A6F}" srcOrd="0" destOrd="0" presId="urn:microsoft.com/office/officeart/2018/2/layout/IconLabelList"/>
     <dgm:cxn modelId="{41B7A322-2A7E-45FF-B78E-2AAF42935051}" type="presParOf" srcId="{501497E0-294A-49C5-89D2-C909FA231A6F}" destId="{F918D225-4876-42BC-96A3-9EF9540B7B88}" srcOrd="0" destOrd="0" presId="urn:microsoft.com/office/officeart/2018/2/layout/IconLabelList"/>
     <dgm:cxn modelId="{2750350F-B408-4266-BBDE-2A7B81BD8072}" type="presParOf" srcId="{501497E0-294A-49C5-89D2-C909FA231A6F}" destId="{D884340C-78CD-4F9B-8425-A387E6831590}" srcOrd="1" destOrd="0" presId="urn:microsoft.com/office/officeart/2018/2/layout/IconLabelList"/>
@@ -2445,7 +2342,7 @@
                 <a14:useLocalDpi xmlns:a14="http://schemas.microsoft.com/office/drawing/2010/main" val="0"/>
               </a:ext>
               <a:ext uri="{96DAC541-7B7A-43D3-8B79-37D633B846F1}">
-                <asvg:svgBlip xmlns:asvg="http://schemas.microsoft.com/office/drawing/2016/SVG/main" xmlns="" r:embed="rId2"/>
+                <asvg:svgBlip xmlns:asvg="http://schemas.microsoft.com/office/drawing/2016/SVG/main" r:embed="rId2"/>
               </a:ext>
             </a:extLst>
           </a:blip>
@@ -2518,7 +2415,7 @@
         </a:bodyPr>
         <a:lstStyle/>
         <a:p>
-          <a:pPr lvl="0" algn="l" defTabSz="755650">
+          <a:pPr marL="0" lvl="0" indent="0" algn="l" defTabSz="755650">
             <a:lnSpc>
               <a:spcPct val="100000"/>
             </a:lnSpc>
@@ -2528,14 +2425,11 @@
             <a:spcAft>
               <a:spcPct val="35000"/>
             </a:spcAft>
+            <a:buNone/>
           </a:pPr>
           <a:r>
-            <a:rPr lang="en-US" sz="1700" b="0" i="0" kern="1200" dirty="0" smtClean="0"/>
-            <a:t>PURPOSE: For </a:t>
-          </a:r>
-          <a:r>
             <a:rPr lang="en-US" sz="1700" b="0" i="0" kern="1200" dirty="0"/>
-            <a:t>this project, our goal was to build an insightful dashboard including key data </a:t>
+            <a:t>PURPOSE: For this project, our goal was to build an insightful dashboard including key data </a:t>
           </a:r>
           <a:r>
             <a:rPr lang="en-US" sz="1700" kern="1200" dirty="0"/>
@@ -2615,7 +2509,7 @@
                 <a14:useLocalDpi xmlns:a14="http://schemas.microsoft.com/office/drawing/2010/main" val="0"/>
               </a:ext>
               <a:ext uri="{96DAC541-7B7A-43D3-8B79-37D633B846F1}">
-                <asvg:svgBlip xmlns:asvg="http://schemas.microsoft.com/office/drawing/2016/SVG/main" xmlns="" r:embed="rId4"/>
+                <asvg:svgBlip xmlns:asvg="http://schemas.microsoft.com/office/drawing/2016/SVG/main" r:embed="rId4"/>
               </a:ext>
             </a:extLst>
           </a:blip>
@@ -2688,7 +2582,7 @@
         </a:bodyPr>
         <a:lstStyle/>
         <a:p>
-          <a:pPr lvl="0" algn="l" defTabSz="755650">
+          <a:pPr marL="0" lvl="0" indent="0" algn="l" defTabSz="755650">
             <a:lnSpc>
               <a:spcPct val="100000"/>
             </a:lnSpc>
@@ -2698,14 +2592,11 @@
             <a:spcAft>
               <a:spcPct val="35000"/>
             </a:spcAft>
+            <a:buNone/>
           </a:pPr>
           <a:r>
-            <a:rPr lang="en-US" sz="1700" b="0" i="0" kern="1200" dirty="0" smtClean="0"/>
-            <a:t>KEY OBJECTIVE: By </a:t>
-          </a:r>
-          <a:r>
             <a:rPr lang="en-US" sz="1700" b="0" i="0" kern="1200" dirty="0"/>
-            <a:t>analyzing and visualizing the revenue mix and types of care provided at each hospital, the user can uncover trends and insights about the current healthcare system operations in California.</a:t>
+            <a:t>KEY OBJECTIVE: By analyzing and visualizing the revenue mix and types of care provided at each hospital, the user can uncover trends and insights about the current healthcare system operations in California.</a:t>
           </a:r>
           <a:endParaRPr lang="en-US" sz="1700" kern="1200" dirty="0"/>
         </a:p>
@@ -2774,7 +2665,7 @@
           <a:blip xmlns:r="http://schemas.openxmlformats.org/officeDocument/2006/relationships" r:embed="rId5">
             <a:extLst>
               <a:ext uri="{96DAC541-7B7A-43D3-8B79-37D633B846F1}">
-                <asvg:svgBlip xmlns:asvg="http://schemas.microsoft.com/office/drawing/2016/SVG/main" xmlns="" r:embed="rId6"/>
+                <asvg:svgBlip xmlns:asvg="http://schemas.microsoft.com/office/drawing/2016/SVG/main" r:embed="rId6"/>
               </a:ext>
             </a:extLst>
           </a:blip>
@@ -2848,7 +2739,7 @@
         </a:bodyPr>
         <a:lstStyle/>
         <a:p>
-          <a:pPr lvl="0" algn="l" defTabSz="755650">
+          <a:pPr marL="0" lvl="0" indent="0" algn="l" defTabSz="755650">
             <a:lnSpc>
               <a:spcPct val="100000"/>
             </a:lnSpc>
@@ -2858,6 +2749,7 @@
             <a:spcAft>
               <a:spcPct val="35000"/>
             </a:spcAft>
+            <a:buNone/>
           </a:pPr>
           <a:r>
             <a:rPr lang="en-US" sz="1700" kern="1200" dirty="0"/>
@@ -2904,7 +2796,7 @@
           <a:blip xmlns:r="http://schemas.openxmlformats.org/officeDocument/2006/relationships" r:embed="rId1">
             <a:extLst>
               <a:ext uri="{96DAC541-7B7A-43D3-8B79-37D633B846F1}">
-                <asvg:svgBlip xmlns:asvg="http://schemas.microsoft.com/office/drawing/2016/SVG/main" xmlns="" r:embed="rId2"/>
+                <asvg:svgBlip xmlns:asvg="http://schemas.microsoft.com/office/drawing/2016/SVG/main" r:embed="rId2"/>
               </a:ext>
             </a:extLst>
           </a:blip>
@@ -2978,7 +2870,7 @@
         </a:bodyPr>
         <a:lstStyle/>
         <a:p>
-          <a:pPr lvl="0" algn="ctr" defTabSz="755650">
+          <a:pPr marL="0" lvl="0" indent="0" algn="ctr" defTabSz="755650">
             <a:lnSpc>
               <a:spcPct val="100000"/>
             </a:lnSpc>
@@ -2988,18 +2880,11 @@
             <a:spcAft>
               <a:spcPct val="35000"/>
             </a:spcAft>
+            <a:buNone/>
           </a:pPr>
           <a:r>
             <a:rPr lang="en-US" sz="1700" kern="1200" dirty="0"/>
-            <a:t>9 </a:t>
-          </a:r>
-          <a:r>
-            <a:rPr lang="en-US" sz="1700" kern="1200" dirty="0" smtClean="0"/>
-            <a:t>Payer </a:t>
-          </a:r>
-          <a:r>
-            <a:rPr lang="en-US" sz="1700" kern="1200" dirty="0"/>
-            <a:t>Categories</a:t>
+            <a:t>9 Payer Categories</a:t>
           </a:r>
         </a:p>
       </dsp:txBody>
@@ -3025,7 +2910,7 @@
           <a:blip xmlns:r="http://schemas.openxmlformats.org/officeDocument/2006/relationships" r:embed="rId3">
             <a:extLst>
               <a:ext uri="{96DAC541-7B7A-43D3-8B79-37D633B846F1}">
-                <asvg:svgBlip xmlns:asvg="http://schemas.microsoft.com/office/drawing/2016/SVG/main" xmlns="" r:embed="rId4"/>
+                <asvg:svgBlip xmlns:asvg="http://schemas.microsoft.com/office/drawing/2016/SVG/main" r:embed="rId4"/>
               </a:ext>
             </a:extLst>
           </a:blip>
@@ -3099,7 +2984,7 @@
         </a:bodyPr>
         <a:lstStyle/>
         <a:p>
-          <a:pPr lvl="0" algn="ctr" defTabSz="755650">
+          <a:pPr marL="0" lvl="0" indent="0" algn="ctr" defTabSz="755650">
             <a:lnSpc>
               <a:spcPct val="100000"/>
             </a:lnSpc>
@@ -3109,16 +2994,12 @@
             <a:spcAft>
               <a:spcPct val="35000"/>
             </a:spcAft>
+            <a:buNone/>
           </a:pPr>
           <a:r>
             <a:rPr lang="en-US" sz="1700" kern="1200" dirty="0"/>
-            <a:t>431 </a:t>
+            <a:t>431 Hospitals</a:t>
           </a:r>
-          <a:r>
-            <a:rPr lang="en-US" sz="1700" kern="1200" dirty="0" smtClean="0"/>
-            <a:t>Hospitals</a:t>
-          </a:r>
-          <a:endParaRPr lang="en-US" sz="1700" kern="1200" dirty="0"/>
         </a:p>
       </dsp:txBody>
       <dsp:txXfrm>
@@ -3143,7 +3024,7 @@
           <a:blip xmlns:r="http://schemas.openxmlformats.org/officeDocument/2006/relationships" r:embed="rId5">
             <a:extLst>
               <a:ext uri="{96DAC541-7B7A-43D3-8B79-37D633B846F1}">
-                <asvg:svgBlip xmlns:asvg="http://schemas.microsoft.com/office/drawing/2016/SVG/main" xmlns="" r:embed="rId6"/>
+                <asvg:svgBlip xmlns:asvg="http://schemas.microsoft.com/office/drawing/2016/SVG/main" r:embed="rId6"/>
               </a:ext>
             </a:extLst>
           </a:blip>
@@ -3217,7 +3098,7 @@
         </a:bodyPr>
         <a:lstStyle/>
         <a:p>
-          <a:pPr lvl="0" algn="ctr" defTabSz="755650">
+          <a:pPr marL="0" lvl="0" indent="0" algn="ctr" defTabSz="755650">
             <a:lnSpc>
               <a:spcPct val="100000"/>
             </a:lnSpc>
@@ -3227,6 +3108,7 @@
             <a:spcAft>
               <a:spcPct val="35000"/>
             </a:spcAft>
+            <a:buNone/>
           </a:pPr>
           <a:r>
             <a:rPr lang="en-US" sz="1700" kern="1200" dirty="0"/>
@@ -3520,7 +3402,7 @@
   </dgm:layoutNode>
   <dgm:extLst>
     <a:ext uri="{68A01E43-0DF5-4B5B-8FA6-DAF915123BFB}">
-      <dgm1612:lstStyle xmlns:dgm1612="http://schemas.microsoft.com/office/drawing/2016/12/diagram" xmlns="">
+      <dgm1612:lstStyle xmlns:dgm1612="http://schemas.microsoft.com/office/drawing/2016/12/diagram">
         <a:lvl1pPr>
           <a:lnSpc>
             <a:spcPct val="100000"/>
@@ -3715,7 +3597,7 @@
   </dgm:layoutNode>
   <dgm:extLst>
     <a:ext uri="{68A01E43-0DF5-4B5B-8FA6-DAF915123BFB}">
-      <dgm1612:lstStyle xmlns:dgm1612="http://schemas.microsoft.com/office/drawing/2016/12/diagram" xmlns="">
+      <dgm1612:lstStyle xmlns:dgm1612="http://schemas.microsoft.com/office/drawing/2016/12/diagram">
         <a:lvl1pPr>
           <a:lnSpc>
             <a:spcPct val="100000"/>
@@ -5877,7 +5759,7 @@
           <a:p>
             <a:fld id="{D8099AAA-69B8-418C-BEE6-AC95D1A624A2}" type="datetimeFigureOut">
               <a:rPr lang="en-US" smtClean="0"/>
-              <a:t>03/18/2024</a:t>
+              <a:t>3/18/24</a:t>
             </a:fld>
             <a:endParaRPr lang="en-US"/>
           </a:p>
@@ -5941,38 +5823,37 @@
           <a:p>
             <a:pPr lvl="0"/>
             <a:r>
-              <a:rPr lang="en-US" smtClean="0"/>
+              <a:rPr lang="en-US"/>
               <a:t>Edit Master text styles</a:t>
             </a:r>
           </a:p>
           <a:p>
             <a:pPr lvl="1"/>
             <a:r>
-              <a:rPr lang="en-US" smtClean="0"/>
+              <a:rPr lang="en-US"/>
               <a:t>Second level</a:t>
             </a:r>
           </a:p>
           <a:p>
             <a:pPr lvl="2"/>
             <a:r>
-              <a:rPr lang="en-US" smtClean="0"/>
+              <a:rPr lang="en-US"/>
               <a:t>Third level</a:t>
             </a:r>
           </a:p>
           <a:p>
             <a:pPr lvl="3"/>
             <a:r>
-              <a:rPr lang="en-US" smtClean="0"/>
+              <a:rPr lang="en-US"/>
               <a:t>Fourth level</a:t>
             </a:r>
           </a:p>
           <a:p>
             <a:pPr lvl="4"/>
             <a:r>
-              <a:rPr lang="en-US" smtClean="0"/>
+              <a:rPr lang="en-US"/>
               <a:t>Fifth level</a:t>
             </a:r>
-            <a:endParaRPr lang="en-US"/>
           </a:p>
         </p:txBody>
       </p:sp>
@@ -6294,7 +6175,7 @@
           <a:p>
             <a:fld id="{9ACEF446-EFA3-4D05-AA19-5D78259E99C0}" type="slidenum">
               <a:rPr lang="en-US" smtClean="0"/>
-              <a:t>11</a:t>
+              <a:t>13</a:t>
             </a:fld>
             <a:endParaRPr lang="en-US"/>
           </a:p>
@@ -6537,7 +6418,7 @@
           <a:p>
             <a:fld id="{14D49F24-C369-408B-985E-7F462C90F2F7}" type="datetimeFigureOut">
               <a:rPr lang="en-US" smtClean="0"/>
-              <a:t>03/18/2024</a:t>
+              <a:t>3/18/24</a:t>
             </a:fld>
             <a:endParaRPr lang="en-US"/>
           </a:p>
@@ -6707,7 +6588,7 @@
           <a:p>
             <a:fld id="{14D49F24-C369-408B-985E-7F462C90F2F7}" type="datetimeFigureOut">
               <a:rPr lang="en-US" smtClean="0"/>
-              <a:t>03/18/2024</a:t>
+              <a:t>3/18/24</a:t>
             </a:fld>
             <a:endParaRPr lang="en-US"/>
           </a:p>
@@ -6887,7 +6768,7 @@
           <a:p>
             <a:fld id="{14D49F24-C369-408B-985E-7F462C90F2F7}" type="datetimeFigureOut">
               <a:rPr lang="en-US" smtClean="0"/>
-              <a:t>03/18/2024</a:t>
+              <a:t>3/18/24</a:t>
             </a:fld>
             <a:endParaRPr lang="en-US"/>
           </a:p>
@@ -7057,7 +6938,7 @@
           <a:p>
             <a:fld id="{14D49F24-C369-408B-985E-7F462C90F2F7}" type="datetimeFigureOut">
               <a:rPr lang="en-US" smtClean="0"/>
-              <a:t>03/18/2024</a:t>
+              <a:t>3/18/24</a:t>
             </a:fld>
             <a:endParaRPr lang="en-US"/>
           </a:p>
@@ -7315,7 +7196,7 @@
           <a:p>
             <a:fld id="{14D49F24-C369-408B-985E-7F462C90F2F7}" type="datetimeFigureOut">
               <a:rPr lang="en-US" smtClean="0"/>
-              <a:t>03/18/2024</a:t>
+              <a:t>3/18/24</a:t>
             </a:fld>
             <a:endParaRPr lang="en-US"/>
           </a:p>
@@ -7603,7 +7484,7 @@
           <a:p>
             <a:fld id="{14D49F24-C369-408B-985E-7F462C90F2F7}" type="datetimeFigureOut">
               <a:rPr lang="en-US" smtClean="0"/>
-              <a:t>03/18/2024</a:t>
+              <a:t>3/18/24</a:t>
             </a:fld>
             <a:endParaRPr lang="en-US"/>
           </a:p>
@@ -8045,7 +7926,7 @@
           <a:p>
             <a:fld id="{14D49F24-C369-408B-985E-7F462C90F2F7}" type="datetimeFigureOut">
               <a:rPr lang="en-US" smtClean="0"/>
-              <a:t>03/18/2024</a:t>
+              <a:t>3/18/24</a:t>
             </a:fld>
             <a:endParaRPr lang="en-US"/>
           </a:p>
@@ -8163,7 +8044,7 @@
           <a:p>
             <a:fld id="{14D49F24-C369-408B-985E-7F462C90F2F7}" type="datetimeFigureOut">
               <a:rPr lang="en-US" smtClean="0"/>
-              <a:t>03/18/2024</a:t>
+              <a:t>3/18/24</a:t>
             </a:fld>
             <a:endParaRPr lang="en-US"/>
           </a:p>
@@ -8258,7 +8139,7 @@
           <a:p>
             <a:fld id="{14D49F24-C369-408B-985E-7F462C90F2F7}" type="datetimeFigureOut">
               <a:rPr lang="en-US" smtClean="0"/>
-              <a:t>03/18/2024</a:t>
+              <a:t>3/18/24</a:t>
             </a:fld>
             <a:endParaRPr lang="en-US"/>
           </a:p>
@@ -8546,7 +8427,7 @@
           <a:p>
             <a:fld id="{14D49F24-C369-408B-985E-7F462C90F2F7}" type="datetimeFigureOut">
               <a:rPr lang="en-US" smtClean="0"/>
-              <a:t>03/18/2024</a:t>
+              <a:t>3/18/24</a:t>
             </a:fld>
             <a:endParaRPr lang="en-US"/>
           </a:p>
@@ -8819,7 +8700,7 @@
           <a:p>
             <a:fld id="{14D49F24-C369-408B-985E-7F462C90F2F7}" type="datetimeFigureOut">
               <a:rPr lang="en-US" smtClean="0"/>
-              <a:t>03/18/2024</a:t>
+              <a:t>3/18/24</a:t>
             </a:fld>
             <a:endParaRPr lang="en-US"/>
           </a:p>
@@ -9116,7 +8997,7 @@
           <a:p>
             <a:fld id="{14D49F24-C369-408B-985E-7F462C90F2F7}" type="datetimeFigureOut">
               <a:rPr lang="en-US" smtClean="0"/>
-              <a:t>03/18/2024</a:t>
+              <a:t>3/18/24</a:t>
             </a:fld>
             <a:endParaRPr lang="en-US"/>
           </a:p>
@@ -9614,7 +9495,7 @@
                 <a16:creationId xmlns:a16="http://schemas.microsoft.com/office/drawing/2014/main" id="{9FDD9264-A478-4B82-A891-2BEA8BF9F68A}"/>
               </a:ext>
               <a:ext uri="{C183D7F6-B498-43B3-948B-1728B52AA6E4}">
-                <adec:decorative xmlns:adec="http://schemas.microsoft.com/office/drawing/2017/decorative" xmlns="" val="1"/>
+                <adec:decorative xmlns:adec="http://schemas.microsoft.com/office/drawing/2017/decorative" val="1"/>
               </a:ext>
             </a:extLst>
           </p:cNvPr>
@@ -9709,7 +9590,7 @@
                 <a16:creationId xmlns:a16="http://schemas.microsoft.com/office/drawing/2014/main" id="{C4D755E9-CEF5-43A7-A514-4664F25F398C}"/>
               </a:ext>
               <a:ext uri="{C183D7F6-B498-43B3-948B-1728B52AA6E4}">
-                <adec:decorative xmlns:adec="http://schemas.microsoft.com/office/drawing/2017/decorative" xmlns="" val="1"/>
+                <adec:decorative xmlns:adec="http://schemas.microsoft.com/office/drawing/2017/decorative" val="1"/>
               </a:ext>
             </a:extLst>
           </p:cNvPr>
@@ -9833,7 +9714,7 @@
           <a:lstStyle/>
           <a:p>
             <a:r>
-              <a:rPr lang="en-US" sz="2400" dirty="0" smtClean="0">
+              <a:rPr lang="en-US" sz="2400" dirty="0">
                 <a:effectLst>
                   <a:outerShdw blurRad="38100" dist="38100" dir="2700000" algn="tl">
                     <a:srgbClr val="000000">
@@ -9844,15 +9725,6 @@
               </a:rPr>
               <a:t>Data Visualization Track</a:t>
             </a:r>
-            <a:endParaRPr lang="en-US" sz="2400" dirty="0">
-              <a:effectLst>
-                <a:outerShdw blurRad="38100" dist="38100" dir="2700000" algn="tl">
-                  <a:srgbClr val="000000">
-                    <a:alpha val="43137"/>
-                  </a:srgbClr>
-                </a:outerShdw>
-              </a:effectLst>
-            </a:endParaRPr>
           </a:p>
         </p:txBody>
       </p:sp>
@@ -9864,7 +9736,7 @@
                 <a16:creationId xmlns:a16="http://schemas.microsoft.com/office/drawing/2014/main" id="{2BF879CD-ED15-450F-B829-699C694D2EBC}"/>
               </a:ext>
               <a:ext uri="{C183D7F6-B498-43B3-948B-1728B52AA6E4}">
-                <adec:decorative xmlns:adec="http://schemas.microsoft.com/office/drawing/2017/decorative" xmlns="" val="1"/>
+                <adec:decorative xmlns:adec="http://schemas.microsoft.com/office/drawing/2017/decorative" val="1"/>
               </a:ext>
             </a:extLst>
           </p:cNvPr>
@@ -10191,10 +10063,9 @@
           </a:lstStyle>
           <a:p>
             <a:r>
-              <a:rPr lang="en-US" sz="2000" dirty="0" smtClean="0"/>
+              <a:rPr lang="en-US" sz="2000" dirty="0"/>
               <a:t>Presented by Jenae Journot, Manuel Sosa and Greg Thomas</a:t>
             </a:r>
-            <a:endParaRPr lang="en-US" sz="2000" dirty="0"/>
           </a:p>
         </p:txBody>
       </p:sp>
@@ -10400,6 +10271,14 @@
 <file path=ppt/slides/slide10.xml><?xml version="1.0" encoding="utf-8"?>
 <p:sld xmlns:a="http://schemas.openxmlformats.org/drawingml/2006/main" xmlns:r="http://schemas.openxmlformats.org/officeDocument/2006/relationships" xmlns:p="http://schemas.openxmlformats.org/presentationml/2006/main">
   <p:cSld>
+    <p:bg>
+      <p:bgPr>
+        <a:solidFill>
+          <a:schemeClr val="bg1"/>
+        </a:solidFill>
+        <a:effectLst/>
+      </p:bgPr>
+    </p:bg>
     <p:spTree>
       <p:nvGrpSpPr>
         <p:cNvPr id="1" name=""/>
@@ -10416,10 +10295,258 @@
       </p:grpSpPr>
       <p:sp>
         <p:nvSpPr>
+          <p:cNvPr id="11" name="Rectangle 10">
+            <a:extLst>
+              <a:ext uri="{FF2B5EF4-FFF2-40B4-BE49-F238E27FC236}">
+                <a16:creationId xmlns:a16="http://schemas.microsoft.com/office/drawing/2014/main" id="{64C9EE1D-12BB-43F7-9A2A-893578DCA63A}"/>
+              </a:ext>
+              <a:ext uri="{C183D7F6-B498-43B3-948B-1728B52AA6E4}">
+                <adec:decorative xmlns:adec="http://schemas.microsoft.com/office/drawing/2017/decorative" val="1"/>
+              </a:ext>
+            </a:extLst>
+          </p:cNvPr>
+          <p:cNvSpPr>
+            <a:spLocks noGrp="1" noRot="1" noChangeAspect="1" noMove="1" noResize="1" noEditPoints="1" noAdjustHandles="1" noChangeArrowheads="1" noChangeShapeType="1" noTextEdit="1"/>
+          </p:cNvSpPr>
+          <p:nvPr>
+            <p:extLst>
+              <p:ext uri="{386F3935-93C4-4BCD-93E2-E3B085C9AB24}">
+                <p16:designElem xmlns:p16="http://schemas.microsoft.com/office/powerpoint/2015/main" val="1"/>
+              </p:ext>
+            </p:extLst>
+          </p:nvPr>
+        </p:nvSpPr>
+        <p:spPr>
+          <a:xfrm>
+            <a:off x="0" y="761999"/>
+            <a:ext cx="9141619" cy="5334001"/>
+          </a:xfrm>
+          <a:prstGeom prst="rect">
+            <a:avLst/>
+          </a:prstGeom>
+          <a:solidFill>
+            <a:schemeClr val="accent1"/>
+          </a:solidFill>
+          <a:ln>
+            <a:noFill/>
+          </a:ln>
+        </p:spPr>
+        <p:style>
+          <a:lnRef idx="2">
+            <a:schemeClr val="accent1">
+              <a:shade val="50000"/>
+            </a:schemeClr>
+          </a:lnRef>
+          <a:fillRef idx="1">
+            <a:schemeClr val="accent1"/>
+          </a:fillRef>
+          <a:effectRef idx="0">
+            <a:schemeClr val="accent1"/>
+          </a:effectRef>
+          <a:fontRef idx="minor">
+            <a:schemeClr val="lt1"/>
+          </a:fontRef>
+        </p:style>
+        <p:txBody>
+          <a:bodyPr/>
+          <a:lstStyle/>
+          <a:p>
+            <a:endParaRPr lang="en-US"/>
+          </a:p>
+        </p:txBody>
+      </p:sp>
+      <p:sp>
+        <p:nvSpPr>
+          <p:cNvPr id="13" name="Rectangle 12">
+            <a:extLst>
+              <a:ext uri="{FF2B5EF4-FFF2-40B4-BE49-F238E27FC236}">
+                <a16:creationId xmlns:a16="http://schemas.microsoft.com/office/drawing/2014/main" id="{43962A31-C54E-4762-B155-59777FED1C75}"/>
+              </a:ext>
+              <a:ext uri="{C183D7F6-B498-43B3-948B-1728B52AA6E4}">
+                <adec:decorative xmlns:adec="http://schemas.microsoft.com/office/drawing/2017/decorative" val="1"/>
+              </a:ext>
+            </a:extLst>
+          </p:cNvPr>
+          <p:cNvSpPr>
+            <a:spLocks noGrp="1" noRot="1" noChangeAspect="1" noMove="1" noResize="1" noEditPoints="1" noAdjustHandles="1" noChangeArrowheads="1" noChangeShapeType="1" noTextEdit="1"/>
+          </p:cNvSpPr>
+          <p:nvPr>
+            <p:extLst>
+              <p:ext uri="{386F3935-93C4-4BCD-93E2-E3B085C9AB24}">
+                <p16:designElem xmlns:p16="http://schemas.microsoft.com/office/powerpoint/2015/main" val="1"/>
+              </p:ext>
+            </p:extLst>
+          </p:nvPr>
+        </p:nvSpPr>
+        <p:spPr>
+          <a:xfrm>
+            <a:off x="9270263" y="761999"/>
+            <a:ext cx="2925318" cy="5334001"/>
+          </a:xfrm>
+          <a:prstGeom prst="rect">
+            <a:avLst/>
+          </a:prstGeom>
+          <a:solidFill>
+            <a:srgbClr val="C8C8C8">
+              <a:alpha val="49804"/>
+            </a:srgbClr>
+          </a:solidFill>
+          <a:ln>
+            <a:noFill/>
+          </a:ln>
+        </p:spPr>
+        <p:style>
+          <a:lnRef idx="2">
+            <a:schemeClr val="accent1">
+              <a:shade val="50000"/>
+            </a:schemeClr>
+          </a:lnRef>
+          <a:fillRef idx="1">
+            <a:schemeClr val="accent1"/>
+          </a:fillRef>
+          <a:effectRef idx="0">
+            <a:schemeClr val="accent1"/>
+          </a:effectRef>
+          <a:fontRef idx="minor">
+            <a:schemeClr val="lt1"/>
+          </a:fontRef>
+        </p:style>
+        <p:txBody>
+          <a:bodyPr/>
+          <a:lstStyle/>
+          <a:p>
+            <a:endParaRPr lang="en-US"/>
+          </a:p>
+        </p:txBody>
+      </p:sp>
+      <p:sp useBgFill="1">
+        <p:nvSpPr>
+          <p:cNvPr id="15" name="Rectangle 14">
+            <a:extLst>
+              <a:ext uri="{FF2B5EF4-FFF2-40B4-BE49-F238E27FC236}">
+                <a16:creationId xmlns:a16="http://schemas.microsoft.com/office/drawing/2014/main" id="{4B392D36-B685-45E0-B197-6EE5D748093B}"/>
+              </a:ext>
+              <a:ext uri="{C183D7F6-B498-43B3-948B-1728B52AA6E4}">
+                <adec:decorative xmlns:adec="http://schemas.microsoft.com/office/drawing/2017/decorative" val="1"/>
+              </a:ext>
+            </a:extLst>
+          </p:cNvPr>
+          <p:cNvSpPr>
+            <a:spLocks noGrp="1" noRot="1" noChangeAspect="1" noMove="1" noResize="1" noEditPoints="1" noAdjustHandles="1" noChangeArrowheads="1" noChangeShapeType="1" noTextEdit="1"/>
+          </p:cNvSpPr>
+          <p:nvPr>
+            <p:extLst>
+              <p:ext uri="{386F3935-93C4-4BCD-93E2-E3B085C9AB24}">
+                <p16:designElem xmlns:p16="http://schemas.microsoft.com/office/powerpoint/2015/main" val="1"/>
+              </p:ext>
+            </p:extLst>
+          </p:nvPr>
+        </p:nvSpPr>
+        <p:spPr>
+          <a:xfrm>
+            <a:off x="0" y="0"/>
+            <a:ext cx="12191999" cy="6858000"/>
+          </a:xfrm>
+          <a:prstGeom prst="rect">
+            <a:avLst/>
+          </a:prstGeom>
+          <a:ln>
+            <a:noFill/>
+          </a:ln>
+        </p:spPr>
+        <p:style>
+          <a:lnRef idx="2">
+            <a:schemeClr val="accent1">
+              <a:shade val="50000"/>
+            </a:schemeClr>
+          </a:lnRef>
+          <a:fillRef idx="1">
+            <a:schemeClr val="accent1"/>
+          </a:fillRef>
+          <a:effectRef idx="0">
+            <a:schemeClr val="accent1"/>
+          </a:effectRef>
+          <a:fontRef idx="minor">
+            <a:schemeClr val="lt1"/>
+          </a:fontRef>
+        </p:style>
+        <p:txBody>
+          <a:bodyPr rtlCol="0" anchor="ctr"/>
+          <a:lstStyle/>
+          <a:p>
+            <a:pPr algn="ctr"/>
+            <a:endParaRPr lang="en-US"/>
+          </a:p>
+        </p:txBody>
+      </p:sp>
+      <p:sp>
+        <p:nvSpPr>
+          <p:cNvPr id="17" name="Rectangle 16">
+            <a:extLst>
+              <a:ext uri="{FF2B5EF4-FFF2-40B4-BE49-F238E27FC236}">
+                <a16:creationId xmlns:a16="http://schemas.microsoft.com/office/drawing/2014/main" id="{9DCA8533-CC5E-4754-9A04-047EDE49E0F9}"/>
+              </a:ext>
+              <a:ext uri="{C183D7F6-B498-43B3-948B-1728B52AA6E4}">
+                <adec:decorative xmlns:adec="http://schemas.microsoft.com/office/drawing/2017/decorative" val="1"/>
+              </a:ext>
+            </a:extLst>
+          </p:cNvPr>
+          <p:cNvSpPr>
+            <a:spLocks noGrp="1" noRot="1" noChangeAspect="1" noMove="1" noResize="1" noEditPoints="1" noAdjustHandles="1" noChangeArrowheads="1" noChangeShapeType="1" noTextEdit="1"/>
+          </p:cNvSpPr>
+          <p:nvPr>
+            <p:extLst>
+              <p:ext uri="{386F3935-93C4-4BCD-93E2-E3B085C9AB24}">
+                <p16:designElem xmlns:p16="http://schemas.microsoft.com/office/powerpoint/2015/main" val="1"/>
+              </p:ext>
+            </p:extLst>
+          </p:nvPr>
+        </p:nvSpPr>
+        <p:spPr>
+          <a:xfrm>
+            <a:off x="0" y="4367639"/>
+            <a:ext cx="11707367" cy="1852186"/>
+          </a:xfrm>
+          <a:prstGeom prst="rect">
+            <a:avLst/>
+          </a:prstGeom>
+          <a:solidFill>
+            <a:schemeClr val="accent1"/>
+          </a:solidFill>
+          <a:ln>
+            <a:noFill/>
+          </a:ln>
+        </p:spPr>
+        <p:style>
+          <a:lnRef idx="2">
+            <a:schemeClr val="accent1">
+              <a:shade val="50000"/>
+            </a:schemeClr>
+          </a:lnRef>
+          <a:fillRef idx="1">
+            <a:schemeClr val="accent1"/>
+          </a:fillRef>
+          <a:effectRef idx="0">
+            <a:schemeClr val="accent1"/>
+          </a:effectRef>
+          <a:fontRef idx="minor">
+            <a:schemeClr val="lt1"/>
+          </a:fontRef>
+        </p:style>
+        <p:txBody>
+          <a:bodyPr/>
+          <a:lstStyle/>
+          <a:p>
+            <a:endParaRPr lang="en-US"/>
+          </a:p>
+        </p:txBody>
+      </p:sp>
+      <p:sp>
+        <p:nvSpPr>
           <p:cNvPr id="2" name="Title 1">
             <a:extLst>
               <a:ext uri="{FF2B5EF4-FFF2-40B4-BE49-F238E27FC236}">
-                <a16:creationId xmlns:a16="http://schemas.microsoft.com/office/drawing/2014/main" id="{2702D8B7-D014-7167-C342-BBF94440264C}"/>
+                <a16:creationId xmlns:a16="http://schemas.microsoft.com/office/drawing/2014/main" id="{42DDEF5E-97CF-67AD-61E7-5031AE23B6A0}"/>
               </a:ext>
             </a:extLst>
           </p:cNvPr>
@@ -10430,16 +10557,223 @@
             <p:ph type="title"/>
           </p:nvPr>
         </p:nvSpPr>
-        <p:spPr/>
+        <p:spPr>
+          <a:xfrm>
+            <a:off x="1069848" y="4590661"/>
+            <a:ext cx="10210862" cy="1065690"/>
+          </a:xfrm>
+        </p:spPr>
+        <p:txBody>
+          <a:bodyPr vert="horz" lIns="91440" tIns="45720" rIns="91440" bIns="45720" rtlCol="0" anchor="b">
+            <a:normAutofit/>
+          </a:bodyPr>
+          <a:lstStyle/>
+          <a:p>
+            <a:r>
+              <a:rPr lang="en-US" sz="5000" spc="-100" dirty="0"/>
+              <a:t>Net Patient Revenue by Payer Category</a:t>
+            </a:r>
+          </a:p>
+        </p:txBody>
+      </p:sp>
+      <p:pic>
+        <p:nvPicPr>
+          <p:cNvPr id="6" name="Picture 5">
+            <a:extLst>
+              <a:ext uri="{FF2B5EF4-FFF2-40B4-BE49-F238E27FC236}">
+                <a16:creationId xmlns:a16="http://schemas.microsoft.com/office/drawing/2014/main" id="{1DE17641-4937-3F7E-4890-F0E6B17DE326}"/>
+              </a:ext>
+            </a:extLst>
+          </p:cNvPr>
+          <p:cNvPicPr>
+            <a:picLocks noChangeAspect="1"/>
+          </p:cNvPicPr>
+          <p:nvPr/>
+        </p:nvPicPr>
+        <p:blipFill>
+          <a:blip r:embed="rId2">
+            <a:extLst>
+              <a:ext uri="{28A0092B-C50C-407E-A947-70E740481C1C}">
+                <a14:useLocalDpi xmlns:a14="http://schemas.microsoft.com/office/drawing/2010/main" val="0"/>
+              </a:ext>
+            </a:extLst>
+          </a:blip>
+          <a:stretch>
+            <a:fillRect/>
+          </a:stretch>
+        </p:blipFill>
+        <p:spPr>
+          <a:xfrm>
+            <a:off x="303959" y="727252"/>
+            <a:ext cx="5730399" cy="2936830"/>
+          </a:xfrm>
+          <a:prstGeom prst="rect">
+            <a:avLst/>
+          </a:prstGeom>
+        </p:spPr>
+      </p:pic>
+      <p:pic>
+        <p:nvPicPr>
+          <p:cNvPr id="4" name="Picture 3">
+            <a:extLst>
+              <a:ext uri="{FF2B5EF4-FFF2-40B4-BE49-F238E27FC236}">
+                <a16:creationId xmlns:a16="http://schemas.microsoft.com/office/drawing/2014/main" id="{A7BC05BB-32B4-015B-27E1-A92762543004}"/>
+              </a:ext>
+            </a:extLst>
+          </p:cNvPr>
+          <p:cNvPicPr>
+            <a:picLocks noChangeAspect="1"/>
+          </p:cNvPicPr>
+          <p:nvPr/>
+        </p:nvPicPr>
+        <p:blipFill>
+          <a:blip r:embed="rId3"/>
+          <a:stretch>
+            <a:fillRect/>
+          </a:stretch>
+        </p:blipFill>
+        <p:spPr>
+          <a:xfrm>
+            <a:off x="6338317" y="923364"/>
+            <a:ext cx="4789992" cy="2802145"/>
+          </a:xfrm>
+          <a:prstGeom prst="rect">
+            <a:avLst/>
+          </a:prstGeom>
+        </p:spPr>
+      </p:pic>
+    </p:spTree>
+    <p:extLst>
+      <p:ext uri="{BB962C8B-B14F-4D97-AF65-F5344CB8AC3E}">
+        <p14:creationId xmlns:p14="http://schemas.microsoft.com/office/powerpoint/2010/main" val="73709696"/>
+      </p:ext>
+    </p:extLst>
+  </p:cSld>
+  <p:clrMapOvr>
+    <a:masterClrMapping/>
+  </p:clrMapOvr>
+</p:sld>
+</file>
+
+<file path=ppt/slides/slide11.xml><?xml version="1.0" encoding="utf-8"?>
+<p:sld xmlns:a="http://schemas.openxmlformats.org/drawingml/2006/main" xmlns:r="http://schemas.openxmlformats.org/officeDocument/2006/relationships" xmlns:p="http://schemas.openxmlformats.org/presentationml/2006/main">
+  <p:cSld>
+    <p:bg>
+      <p:bgPr>
+        <a:solidFill>
+          <a:schemeClr val="bg1"/>
+        </a:solidFill>
+        <a:effectLst/>
+      </p:bgPr>
+    </p:bg>
+    <p:spTree>
+      <p:nvGrpSpPr>
+        <p:cNvPr id="1" name=""/>
+        <p:cNvGrpSpPr/>
+        <p:nvPr/>
+      </p:nvGrpSpPr>
+      <p:grpSpPr>
+        <a:xfrm>
+          <a:off x="0" y="0"/>
+          <a:ext cx="0" cy="0"/>
+          <a:chOff x="0" y="0"/>
+          <a:chExt cx="0" cy="0"/>
+        </a:xfrm>
+      </p:grpSpPr>
+      <p:sp>
+        <p:nvSpPr>
+          <p:cNvPr id="10" name="Rectangle 9">
+            <a:extLst>
+              <a:ext uri="{FF2B5EF4-FFF2-40B4-BE49-F238E27FC236}">
+                <a16:creationId xmlns:a16="http://schemas.microsoft.com/office/drawing/2014/main" id="{681577AD-DA5F-48B3-8FB9-5199BA9EE681}"/>
+              </a:ext>
+              <a:ext uri="{C183D7F6-B498-43B3-948B-1728B52AA6E4}">
+                <adec:decorative xmlns:adec="http://schemas.microsoft.com/office/drawing/2017/decorative" val="1"/>
+              </a:ext>
+            </a:extLst>
+          </p:cNvPr>
+          <p:cNvSpPr>
+            <a:spLocks noGrp="1" noRot="1" noChangeAspect="1" noMove="1" noResize="1" noEditPoints="1" noAdjustHandles="1" noChangeArrowheads="1" noChangeShapeType="1" noTextEdit="1"/>
+          </p:cNvSpPr>
+          <p:nvPr>
+            <p:extLst>
+              <p:ext uri="{386F3935-93C4-4BCD-93E2-E3B085C9AB24}">
+                <p16:designElem xmlns:p16="http://schemas.microsoft.com/office/powerpoint/2015/main" val="1"/>
+              </p:ext>
+            </p:extLst>
+          </p:nvPr>
+        </p:nvSpPr>
+        <p:spPr>
+          <a:xfrm>
+            <a:off x="1" y="765350"/>
+            <a:ext cx="4642228" cy="5330650"/>
+          </a:xfrm>
+          <a:prstGeom prst="rect">
+            <a:avLst/>
+          </a:prstGeom>
+          <a:solidFill>
+            <a:schemeClr val="accent1"/>
+          </a:solidFill>
+          <a:ln>
+            <a:noFill/>
+          </a:ln>
+        </p:spPr>
+        <p:style>
+          <a:lnRef idx="2">
+            <a:schemeClr val="accent1">
+              <a:shade val="50000"/>
+            </a:schemeClr>
+          </a:lnRef>
+          <a:fillRef idx="1">
+            <a:schemeClr val="accent1"/>
+          </a:fillRef>
+          <a:effectRef idx="0">
+            <a:schemeClr val="accent1"/>
+          </a:effectRef>
+          <a:fontRef idx="minor">
+            <a:schemeClr val="lt1"/>
+          </a:fontRef>
+        </p:style>
         <p:txBody>
           <a:bodyPr/>
           <a:lstStyle/>
           <a:p>
+            <a:endParaRPr lang="en-US"/>
+          </a:p>
+        </p:txBody>
+      </p:sp>
+      <p:sp>
+        <p:nvSpPr>
+          <p:cNvPr id="2" name="Title 1">
+            <a:extLst>
+              <a:ext uri="{FF2B5EF4-FFF2-40B4-BE49-F238E27FC236}">
+                <a16:creationId xmlns:a16="http://schemas.microsoft.com/office/drawing/2014/main" id="{006AEA51-05B8-7657-CD71-E43E34445B2B}"/>
+              </a:ext>
+            </a:extLst>
+          </p:cNvPr>
+          <p:cNvSpPr>
+            <a:spLocks noGrp="1"/>
+          </p:cNvSpPr>
+          <p:nvPr>
+            <p:ph type="title"/>
+          </p:nvPr>
+        </p:nvSpPr>
+        <p:spPr>
+          <a:xfrm>
+            <a:off x="289249" y="1123837"/>
+            <a:ext cx="4016116" cy="1255469"/>
+          </a:xfrm>
+        </p:spPr>
+        <p:txBody>
+          <a:bodyPr>
+            <a:normAutofit/>
+          </a:bodyPr>
+          <a:lstStyle/>
+          <a:p>
             <a:r>
               <a:rPr lang="en-US" dirty="0"/>
-              <a:t>Data Limitations</a:t>
+              <a:t>Type of Care</a:t>
             </a:r>
-            <a:endParaRPr lang="en-US" dirty="0"/>
           </a:p>
         </p:txBody>
       </p:sp>
@@ -10448,7 +10782,7 @@
           <p:cNvPr id="3" name="Content Placeholder 2">
             <a:extLst>
               <a:ext uri="{FF2B5EF4-FFF2-40B4-BE49-F238E27FC236}">
-                <a16:creationId xmlns:a16="http://schemas.microsoft.com/office/drawing/2014/main" id="{B1F4A6BB-5547-0AA1-FB5B-67D439798FAD}"/>
+                <a16:creationId xmlns:a16="http://schemas.microsoft.com/office/drawing/2014/main" id="{823EF9F2-09E6-EDD1-080B-B22A4AA63FE0}"/>
               </a:ext>
             </a:extLst>
           </p:cNvPr>
@@ -10459,68 +10793,173 @@
             <p:ph idx="1"/>
           </p:nvPr>
         </p:nvSpPr>
-        <p:spPr/>
+        <p:spPr>
+          <a:xfrm>
+            <a:off x="289249" y="2510395"/>
+            <a:ext cx="4016116" cy="3274586"/>
+          </a:xfrm>
+        </p:spPr>
         <p:txBody>
-          <a:bodyPr/>
+          <a:bodyPr anchor="t">
+            <a:normAutofit/>
+          </a:bodyPr>
           <a:lstStyle/>
           <a:p>
             <a:r>
-              <a:rPr lang="en-US" dirty="0" smtClean="0"/>
-              <a:t>Lack </a:t>
+              <a:rPr lang="en-US">
+                <a:solidFill>
+                  <a:srgbClr val="FFFFFF"/>
+                </a:solidFill>
+              </a:rPr>
+              <a:t>The type of care provided at each hospital varied. For most hospitals, the majority of care provided fell under Acute Care – which includes services like medical/surgical acute, obstetrics acute, definitive observation, medical/surgical intensive care, and coronary care.</a:t>
             </a:r>
-            <a:r>
-              <a:rPr lang="en-US" dirty="0"/>
-              <a:t>of Comparative Data by years</a:t>
-            </a:r>
-            <a:r>
-              <a:rPr lang="en-US" dirty="0" smtClean="0"/>
-              <a:t>:</a:t>
-            </a:r>
-            <a:endParaRPr lang="en-US" dirty="0"/>
-          </a:p>
-          <a:p>
-            <a:pPr marL="0" indent="0">
-              <a:buNone/>
-            </a:pPr>
-            <a:r>
-              <a:rPr lang="en-US" dirty="0"/>
-              <a:t>The data represents one specific year, 2022. Without time-based data, it's challenging to discern trends, assess progress, or make year-over-year comparisons.</a:t>
-            </a:r>
-          </a:p>
-          <a:p>
-            <a:endParaRPr lang="en-US" dirty="0"/>
-          </a:p>
-          <a:p>
-            <a:r>
-              <a:rPr lang="en-US" dirty="0" smtClean="0"/>
-              <a:t>Potential </a:t>
-            </a:r>
-            <a:r>
-              <a:rPr lang="en-US" dirty="0"/>
-              <a:t>for Misinterpretation</a:t>
-            </a:r>
-            <a:r>
-              <a:rPr lang="en-US" dirty="0" smtClean="0"/>
-              <a:t>:</a:t>
-            </a:r>
-            <a:endParaRPr lang="en-US" dirty="0"/>
-          </a:p>
-          <a:p>
-            <a:pPr marL="0" indent="0">
-              <a:buNone/>
-            </a:pPr>
-            <a:r>
-              <a:rPr lang="en-US" dirty="0"/>
-              <a:t>The charts do not provide understanding on the underlying factors, such as policy changes or patient demographics, that could affect both net revenue and total asset size.</a:t>
-            </a:r>
-            <a:endParaRPr lang="en-US" dirty="0"/>
           </a:p>
         </p:txBody>
       </p:sp>
+      <p:pic>
+        <p:nvPicPr>
+          <p:cNvPr id="5" name="Picture 4">
+            <a:extLst>
+              <a:ext uri="{FF2B5EF4-FFF2-40B4-BE49-F238E27FC236}">
+                <a16:creationId xmlns:a16="http://schemas.microsoft.com/office/drawing/2014/main" id="{0852B3FF-D1E9-2ABC-74E5-ACEBBDDFE0D0}"/>
+              </a:ext>
+            </a:extLst>
+          </p:cNvPr>
+          <p:cNvPicPr>
+            <a:picLocks noChangeAspect="1"/>
+          </p:cNvPicPr>
+          <p:nvPr/>
+        </p:nvPicPr>
+        <p:blipFill>
+          <a:blip r:embed="rId2">
+            <a:extLst>
+              <a:ext uri="{28A0092B-C50C-407E-A947-70E740481C1C}">
+                <a14:useLocalDpi xmlns:a14="http://schemas.microsoft.com/office/drawing/2010/main" val="0"/>
+              </a:ext>
+            </a:extLst>
+          </a:blip>
+          <a:srcRect/>
+          <a:stretch/>
+        </p:blipFill>
+        <p:spPr>
+          <a:xfrm>
+            <a:off x="5137462" y="675257"/>
+            <a:ext cx="6193767" cy="2663649"/>
+          </a:xfrm>
+          <a:prstGeom prst="rect">
+            <a:avLst/>
+          </a:prstGeom>
+          <a:ln>
+            <a:solidFill>
+              <a:schemeClr val="accent2"/>
+            </a:solidFill>
+          </a:ln>
+        </p:spPr>
+      </p:pic>
+      <p:pic>
+        <p:nvPicPr>
+          <p:cNvPr id="7" name="Picture 6">
+            <a:extLst>
+              <a:ext uri="{FF2B5EF4-FFF2-40B4-BE49-F238E27FC236}">
+                <a16:creationId xmlns:a16="http://schemas.microsoft.com/office/drawing/2014/main" id="{4A3001BC-2BA8-E361-1B49-1994C651D223}"/>
+              </a:ext>
+            </a:extLst>
+          </p:cNvPr>
+          <p:cNvPicPr>
+            <a:picLocks noChangeAspect="1"/>
+          </p:cNvPicPr>
+          <p:nvPr/>
+        </p:nvPicPr>
+        <p:blipFill>
+          <a:blip r:embed="rId3">
+            <a:extLst>
+              <a:ext uri="{28A0092B-C50C-407E-A947-70E740481C1C}">
+                <a14:useLocalDpi xmlns:a14="http://schemas.microsoft.com/office/drawing/2010/main" val="0"/>
+              </a:ext>
+            </a:extLst>
+          </a:blip>
+          <a:srcRect/>
+          <a:stretch/>
+        </p:blipFill>
+        <p:spPr>
+          <a:xfrm>
+            <a:off x="5137462" y="3671275"/>
+            <a:ext cx="6209800" cy="2663648"/>
+          </a:xfrm>
+          <a:prstGeom prst="rect">
+            <a:avLst/>
+          </a:prstGeom>
+          <a:ln>
+            <a:solidFill>
+              <a:schemeClr val="accent3"/>
+            </a:solidFill>
+          </a:ln>
+        </p:spPr>
+      </p:pic>
+      <p:pic>
+        <p:nvPicPr>
+          <p:cNvPr id="12" name="Picture 11">
+            <a:extLst>
+              <a:ext uri="{FF2B5EF4-FFF2-40B4-BE49-F238E27FC236}">
+                <a16:creationId xmlns:a16="http://schemas.microsoft.com/office/drawing/2014/main" id="{6785A70A-F2A2-A824-FD86-36DD23075ADB}"/>
+              </a:ext>
+            </a:extLst>
+          </p:cNvPr>
+          <p:cNvPicPr>
+            <a:picLocks noChangeAspect="1"/>
+          </p:cNvPicPr>
+          <p:nvPr/>
+        </p:nvPicPr>
+        <p:blipFill>
+          <a:blip r:embed="rId4"/>
+          <a:stretch>
+            <a:fillRect/>
+          </a:stretch>
+        </p:blipFill>
+        <p:spPr>
+          <a:xfrm>
+            <a:off x="5152704" y="3442033"/>
+            <a:ext cx="4884843" cy="175275"/>
+          </a:xfrm>
+          <a:prstGeom prst="rect">
+            <a:avLst/>
+          </a:prstGeom>
+        </p:spPr>
+      </p:pic>
+      <p:pic>
+        <p:nvPicPr>
+          <p:cNvPr id="14" name="Picture 13">
+            <a:extLst>
+              <a:ext uri="{FF2B5EF4-FFF2-40B4-BE49-F238E27FC236}">
+                <a16:creationId xmlns:a16="http://schemas.microsoft.com/office/drawing/2014/main" id="{3A813C7B-52D2-C89C-B4C6-2B68A97C066D}"/>
+              </a:ext>
+            </a:extLst>
+          </p:cNvPr>
+          <p:cNvPicPr>
+            <a:picLocks noChangeAspect="1"/>
+          </p:cNvPicPr>
+          <p:nvPr/>
+        </p:nvPicPr>
+        <p:blipFill>
+          <a:blip r:embed="rId5"/>
+          <a:stretch>
+            <a:fillRect/>
+          </a:stretch>
+        </p:blipFill>
+        <p:spPr>
+          <a:xfrm>
+            <a:off x="5137462" y="438528"/>
+            <a:ext cx="4884843" cy="190517"/>
+          </a:xfrm>
+          <a:prstGeom prst="rect">
+            <a:avLst/>
+          </a:prstGeom>
+        </p:spPr>
+      </p:pic>
     </p:spTree>
     <p:extLst>
       <p:ext uri="{BB962C8B-B14F-4D97-AF65-F5344CB8AC3E}">
-        <p14:creationId xmlns:p14="http://schemas.microsoft.com/office/powerpoint/2010/main" val="3343080671"/>
+        <p14:creationId xmlns:p14="http://schemas.microsoft.com/office/powerpoint/2010/main" val="2222846450"/>
       </p:ext>
     </p:extLst>
   </p:cSld>
@@ -10530,7 +10969,7 @@
 </p:sld>
 </file>
 
-<file path=ppt/slides/slide11.xml><?xml version="1.0" encoding="utf-8"?>
+<file path=ppt/slides/slide12.xml><?xml version="1.0" encoding="utf-8"?>
 <p:sld xmlns:a="http://schemas.openxmlformats.org/drawingml/2006/main" xmlns:r="http://schemas.openxmlformats.org/officeDocument/2006/relationships" xmlns:p="http://schemas.openxmlformats.org/presentationml/2006/main">
   <p:cSld>
     <p:spTree>
@@ -10569,10 +11008,9 @@
           <a:lstStyle/>
           <a:p>
             <a:r>
-              <a:rPr lang="en-US" dirty="0" smtClean="0"/>
-              <a:t>Challenges and Learnings</a:t>
+              <a:rPr lang="en-US" dirty="0"/>
+              <a:t>Data Limitations</a:t>
             </a:r>
-            <a:endParaRPr lang="en-US" dirty="0"/>
           </a:p>
         </p:txBody>
       </p:sp>
@@ -10598,24 +11036,128 @@
           <a:lstStyle/>
           <a:p>
             <a:r>
-              <a:rPr lang="en-US" dirty="0" smtClean="0"/>
+              <a:rPr lang="en-US" dirty="0"/>
+              <a:t>Lack of Comparative Data by years:</a:t>
+            </a:r>
+          </a:p>
+          <a:p>
+            <a:pPr marL="0" indent="0">
+              <a:buNone/>
+            </a:pPr>
+            <a:r>
+              <a:rPr lang="en-US" dirty="0"/>
+              <a:t>The data represents one specific year, 2022. Without time-based data, it's challenging to discern trends, assess progress, or make year-over-year comparisons.</a:t>
+            </a:r>
+          </a:p>
+          <a:p>
+            <a:endParaRPr lang="en-US" dirty="0"/>
+          </a:p>
+          <a:p>
+            <a:r>
+              <a:rPr lang="en-US" dirty="0"/>
+              <a:t>Potential for Misinterpretation:</a:t>
+            </a:r>
+          </a:p>
+          <a:p>
+            <a:pPr marL="0" indent="0">
+              <a:buNone/>
+            </a:pPr>
+            <a:r>
+              <a:rPr lang="en-US" dirty="0"/>
+              <a:t>The charts do not provide understanding on the underlying factors, such as policy changes or patient demographics, that could affect both net revenue and total asset size.</a:t>
+            </a:r>
+          </a:p>
+        </p:txBody>
+      </p:sp>
+    </p:spTree>
+    <p:extLst>
+      <p:ext uri="{BB962C8B-B14F-4D97-AF65-F5344CB8AC3E}">
+        <p14:creationId xmlns:p14="http://schemas.microsoft.com/office/powerpoint/2010/main" val="3343080671"/>
+      </p:ext>
+    </p:extLst>
+  </p:cSld>
+  <p:clrMapOvr>
+    <a:masterClrMapping/>
+  </p:clrMapOvr>
+</p:sld>
+</file>
+
+<file path=ppt/slides/slide13.xml><?xml version="1.0" encoding="utf-8"?>
+<p:sld xmlns:a="http://schemas.openxmlformats.org/drawingml/2006/main" xmlns:r="http://schemas.openxmlformats.org/officeDocument/2006/relationships" xmlns:p="http://schemas.openxmlformats.org/presentationml/2006/main">
+  <p:cSld>
+    <p:spTree>
+      <p:nvGrpSpPr>
+        <p:cNvPr id="1" name=""/>
+        <p:cNvGrpSpPr/>
+        <p:nvPr/>
+      </p:nvGrpSpPr>
+      <p:grpSpPr>
+        <a:xfrm>
+          <a:off x="0" y="0"/>
+          <a:ext cx="0" cy="0"/>
+          <a:chOff x="0" y="0"/>
+          <a:chExt cx="0" cy="0"/>
+        </a:xfrm>
+      </p:grpSpPr>
+      <p:sp>
+        <p:nvSpPr>
+          <p:cNvPr id="2" name="Title 1">
+            <a:extLst>
+              <a:ext uri="{FF2B5EF4-FFF2-40B4-BE49-F238E27FC236}">
+                <a16:creationId xmlns:a16="http://schemas.microsoft.com/office/drawing/2014/main" id="{2702D8B7-D014-7167-C342-BBF94440264C}"/>
+              </a:ext>
+            </a:extLst>
+          </p:cNvPr>
+          <p:cNvSpPr>
+            <a:spLocks noGrp="1"/>
+          </p:cNvSpPr>
+          <p:nvPr>
+            <p:ph type="title"/>
+          </p:nvPr>
+        </p:nvSpPr>
+        <p:spPr/>
+        <p:txBody>
+          <a:bodyPr/>
+          <a:lstStyle/>
+          <a:p>
+            <a:r>
+              <a:rPr lang="en-US" dirty="0"/>
+              <a:t>Challenges and Learnings</a:t>
+            </a:r>
+          </a:p>
+        </p:txBody>
+      </p:sp>
+      <p:sp>
+        <p:nvSpPr>
+          <p:cNvPr id="3" name="Content Placeholder 2">
+            <a:extLst>
+              <a:ext uri="{FF2B5EF4-FFF2-40B4-BE49-F238E27FC236}">
+                <a16:creationId xmlns:a16="http://schemas.microsoft.com/office/drawing/2014/main" id="{B1F4A6BB-5547-0AA1-FB5B-67D439798FAD}"/>
+              </a:ext>
+            </a:extLst>
+          </p:cNvPr>
+          <p:cNvSpPr>
+            <a:spLocks noGrp="1"/>
+          </p:cNvSpPr>
+          <p:nvPr>
+            <p:ph idx="1"/>
+          </p:nvPr>
+        </p:nvSpPr>
+        <p:spPr/>
+        <p:txBody>
+          <a:bodyPr/>
+          <a:lstStyle/>
+          <a:p>
+            <a:r>
+              <a:rPr lang="en-US" dirty="0"/>
               <a:t>Extracting the data from database and importing it into JavaScript</a:t>
             </a:r>
           </a:p>
           <a:p>
             <a:r>
-              <a:rPr lang="en-US" dirty="0" smtClean="0"/>
-              <a:t>Limited Admin </a:t>
+              <a:rPr lang="en-US" dirty="0"/>
+              <a:t>Limited Admin access to install and reinstall applications</a:t>
             </a:r>
-            <a:r>
-              <a:rPr lang="en-US" dirty="0"/>
-              <a:t>access </a:t>
-            </a:r>
-            <a:r>
-              <a:rPr lang="en-US" dirty="0" smtClean="0"/>
-              <a:t>to install and reinstall applications</a:t>
-            </a:r>
-            <a:endParaRPr lang="en-US" dirty="0"/>
           </a:p>
         </p:txBody>
       </p:sp>
@@ -10632,7 +11174,7 @@
 </p:sld>
 </file>
 
-<file path=ppt/slides/slide12.xml><?xml version="1.0" encoding="utf-8"?>
+<file path=ppt/slides/slide14.xml><?xml version="1.0" encoding="utf-8"?>
 <p:sld xmlns:a="http://schemas.openxmlformats.org/drawingml/2006/main" xmlns:r="http://schemas.openxmlformats.org/officeDocument/2006/relationships" xmlns:p="http://schemas.openxmlformats.org/presentationml/2006/main">
   <p:cSld>
     <p:bg>
@@ -10665,7 +11207,7 @@
                 <a16:creationId xmlns:a16="http://schemas.microsoft.com/office/drawing/2014/main" id="{DADC4F84-175A-4AB1-916C-1E5796E1E0D3}"/>
               </a:ext>
               <a:ext uri="{C183D7F6-B498-43B3-948B-1728B52AA6E4}">
-                <adec:decorative xmlns:adec="http://schemas.microsoft.com/office/drawing/2017/decorative" xmlns="" val="1"/>
+                <adec:decorative xmlns:adec="http://schemas.microsoft.com/office/drawing/2017/decorative" val="1"/>
               </a:ext>
             </a:extLst>
           </p:cNvPr>
@@ -10979,6 +11521,13 @@
             </a:schemeClr>
           </a:fontRef>
         </p:style>
+        <p:txBody>
+          <a:bodyPr/>
+          <a:lstStyle/>
+          <a:p>
+            <a:endParaRPr lang="en-US"/>
+          </a:p>
+        </p:txBody>
       </p:sp>
       <p:sp>
         <p:nvSpPr>
@@ -11033,6 +11582,13 @@
             </a:schemeClr>
           </a:fontRef>
         </p:style>
+        <p:txBody>
+          <a:bodyPr/>
+          <a:lstStyle/>
+          <a:p>
+            <a:endParaRPr lang="en-US"/>
+          </a:p>
+        </p:txBody>
       </p:sp>
       <p:sp>
         <p:nvSpPr>
@@ -11087,6 +11643,13 @@
             </a:schemeClr>
           </a:fontRef>
         </p:style>
+        <p:txBody>
+          <a:bodyPr/>
+          <a:lstStyle/>
+          <a:p>
+            <a:endParaRPr lang="en-US"/>
+          </a:p>
+        </p:txBody>
       </p:sp>
       <p:sp>
         <p:nvSpPr>
@@ -11096,7 +11659,7 @@
                 <a16:creationId xmlns:a16="http://schemas.microsoft.com/office/drawing/2014/main" id="{681577AD-DA5F-48B3-8FB9-5199BA9EE681}"/>
               </a:ext>
               <a:ext uri="{C183D7F6-B498-43B3-948B-1728B52AA6E4}">
-                <adec:decorative xmlns:adec="http://schemas.microsoft.com/office/drawing/2017/decorative" xmlns="" val="1"/>
+                <adec:decorative xmlns:adec="http://schemas.microsoft.com/office/drawing/2017/decorative" val="1"/>
               </a:ext>
             </a:extLst>
           </p:cNvPr>
@@ -11179,10 +11742,9 @@
           <a:lstStyle/>
           <a:p>
             <a:r>
-              <a:rPr lang="en-US" dirty="0" smtClean="0"/>
+              <a:rPr lang="en-US" dirty="0"/>
               <a:t>3 Questions to Answer via Visualizations:</a:t>
             </a:r>
-            <a:endParaRPr lang="en-US" dirty="0"/>
           </a:p>
         </p:txBody>
       </p:sp>
@@ -11252,6 +11814,13 @@
               </a:schemeClr>
             </a:fontRef>
           </p:style>
+          <p:txBody>
+            <a:bodyPr/>
+            <a:lstStyle/>
+            <a:p>
+              <a:endParaRPr lang="en-US"/>
+            </a:p>
+          </p:txBody>
         </p:sp>
         <p:sp>
           <p:nvSpPr>
@@ -11319,20 +11888,8 @@
                 </a:spcAft>
               </a:pPr>
               <a:r>
-                <a:rPr lang="en-US" sz="2000" dirty="0" smtClean="0"/>
-                <a:t>Where </a:t>
-              </a:r>
-              <a:r>
                 <a:rPr lang="en-US" sz="2000" dirty="0"/>
-                <a:t>are the </a:t>
-              </a:r>
-              <a:r>
-                <a:rPr lang="en-US" sz="2000" dirty="0" smtClean="0"/>
-                <a:t>ten largest and ten smallest hospitals </a:t>
-              </a:r>
-              <a:r>
-                <a:rPr lang="en-US" sz="2000" dirty="0"/>
-                <a:t>and healthcare systems located?</a:t>
+                <a:t>Where are the ten largest and ten smallest hospitals and healthcare systems located?</a:t>
               </a:r>
             </a:p>
             <a:p>
@@ -11361,7 +11918,7 @@
                   <a:spcPct val="35000"/>
                 </a:spcAft>
               </a:pPr>
-              <a:endParaRPr lang="en-US" sz="2000" dirty="0" smtClean="0"/>
+              <a:endParaRPr lang="en-US" sz="2000" dirty="0"/>
             </a:p>
             <a:p>
               <a:pPr lvl="0" algn="ctr" defTabSz="755650">
@@ -11375,7 +11932,7 @@
                   <a:spcPct val="35000"/>
                 </a:spcAft>
               </a:pPr>
-              <a:endParaRPr lang="en-US" sz="2000" dirty="0" smtClean="0"/>
+              <a:endParaRPr lang="en-US" sz="2000" dirty="0"/>
             </a:p>
             <a:p>
               <a:pPr lvl="0" algn="ctr" defTabSz="755650">
@@ -11390,28 +11947,8 @@
                 </a:spcAft>
               </a:pPr>
               <a:r>
-                <a:rPr lang="en-US" sz="2000" dirty="0" smtClean="0"/>
-                <a:t>What </a:t>
-              </a:r>
-              <a:r>
                 <a:rPr lang="en-US" sz="2000" dirty="0"/>
-                <a:t>is the mix of </a:t>
-              </a:r>
-              <a:r>
-                <a:rPr lang="en-US" sz="2000" dirty="0" smtClean="0"/>
-                <a:t>patient revenue </a:t>
-              </a:r>
-              <a:r>
-                <a:rPr lang="en-US" sz="2000" dirty="0"/>
-                <a:t>by </a:t>
-              </a:r>
-              <a:r>
-                <a:rPr lang="en-US" sz="2000" dirty="0" smtClean="0"/>
-                <a:t>payer category</a:t>
-              </a:r>
-              <a:r>
-                <a:rPr lang="en-US" sz="2000" dirty="0"/>
-                <a:t>?</a:t>
+                <a:t>What is the mix of patient revenue by payer category?</a:t>
               </a:r>
             </a:p>
             <a:p>
@@ -11440,7 +11977,7 @@
                   <a:spcPct val="35000"/>
                 </a:spcAft>
               </a:pPr>
-              <a:endParaRPr lang="en-US" sz="2000" dirty="0" smtClean="0"/>
+              <a:endParaRPr lang="en-US" sz="2000" dirty="0"/>
             </a:p>
             <a:p>
               <a:pPr lvl="0" algn="ctr" defTabSz="755650">
@@ -11469,12 +12006,8 @@
                 </a:spcAft>
               </a:pPr>
               <a:r>
-                <a:rPr lang="en-US" sz="2000" dirty="0" smtClean="0"/>
-                <a:t>What </a:t>
-              </a:r>
-              <a:r>
                 <a:rPr lang="en-US" sz="2000" dirty="0"/>
-                <a:t>is the breakdown of type of care?</a:t>
+                <a:t>What is the breakdown of type of care?</a:t>
               </a:r>
               <a:endParaRPr lang="en-US" sz="2000" kern="1200" dirty="0"/>
             </a:p>
@@ -11527,7 +12060,7 @@
                 <a16:creationId xmlns:a16="http://schemas.microsoft.com/office/drawing/2014/main" id="{681577AD-DA5F-48B3-8FB9-5199BA9EE681}"/>
               </a:ext>
               <a:ext uri="{C183D7F6-B498-43B3-948B-1728B52AA6E4}">
-                <adec:decorative xmlns:adec="http://schemas.microsoft.com/office/drawing/2017/decorative" xmlns="" val="1"/>
+                <adec:decorative xmlns:adec="http://schemas.microsoft.com/office/drawing/2017/decorative" val="1"/>
               </a:ext>
             </a:extLst>
           </p:cNvPr>
@@ -11610,10 +12143,9 @@
           <a:lstStyle/>
           <a:p>
             <a:r>
-              <a:rPr lang="en-US" dirty="0" smtClean="0"/>
+              <a:rPr lang="en-US" dirty="0"/>
               <a:t>Dataset</a:t>
             </a:r>
-            <a:endParaRPr lang="en-US" dirty="0"/>
           </a:p>
         </p:txBody>
       </p:sp>
@@ -11651,98 +12183,42 @@
                   <a:srgbClr val="FFFFFF"/>
                 </a:solidFill>
               </a:rPr>
-              <a:t>Our dataset comprises </a:t>
+              <a:t>Our dataset comprises of 431 records focusing on California hospitals and health systems’ financial and operational data, reported in 2022. We primarily focused on the following information:</a:t>
             </a:r>
-            <a:r>
-              <a:rPr lang="en-US" sz="1600" dirty="0" smtClean="0">
-                <a:solidFill>
-                  <a:srgbClr val="FFFFFF"/>
-                </a:solidFill>
-              </a:rPr>
-              <a:t>of 431 </a:t>
-            </a:r>
+          </a:p>
+          <a:p>
             <a:r>
               <a:rPr lang="en-US" sz="1600" dirty="0">
                 <a:solidFill>
                   <a:srgbClr val="FFFFFF"/>
                 </a:solidFill>
               </a:rPr>
-              <a:t>records focusing </a:t>
+              <a:t>1. Location </a:t>
             </a:r>
-            <a:r>
-              <a:rPr lang="en-US" sz="1600" dirty="0" smtClean="0">
-                <a:solidFill>
-                  <a:srgbClr val="FFFFFF"/>
-                </a:solidFill>
-              </a:rPr>
-              <a:t>on California </a:t>
-            </a:r>
+          </a:p>
+          <a:p>
             <a:r>
               <a:rPr lang="en-US" sz="1600" dirty="0">
                 <a:solidFill>
                   <a:srgbClr val="FFFFFF"/>
                 </a:solidFill>
               </a:rPr>
-              <a:t>hospitals and health </a:t>
+              <a:t>2. Asset size</a:t>
             </a:r>
-            <a:r>
-              <a:rPr lang="en-US" sz="1600" dirty="0" smtClean="0">
-                <a:solidFill>
-                  <a:srgbClr val="FFFFFF"/>
-                </a:solidFill>
-              </a:rPr>
-              <a:t>systems’ financial and operational data, </a:t>
-            </a:r>
+          </a:p>
+          <a:p>
             <a:r>
               <a:rPr lang="en-US" sz="1600" dirty="0">
                 <a:solidFill>
                   <a:srgbClr val="FFFFFF"/>
                 </a:solidFill>
               </a:rPr>
-              <a:t>reported in </a:t>
-            </a:r>
-            <a:r>
-              <a:rPr lang="en-US" sz="1600" dirty="0" smtClean="0">
-                <a:solidFill>
-                  <a:srgbClr val="FFFFFF"/>
-                </a:solidFill>
-              </a:rPr>
-              <a:t>2022. We primarily focused on the following information:</a:t>
-            </a:r>
-          </a:p>
-          <a:p>
-            <a:r>
-              <a:rPr lang="en-US" sz="1600" dirty="0" smtClean="0">
-                <a:solidFill>
-                  <a:srgbClr val="FFFFFF"/>
-                </a:solidFill>
-              </a:rPr>
-              <a:t>1. Location </a:t>
-            </a:r>
-          </a:p>
-          <a:p>
-            <a:r>
-              <a:rPr lang="en-US" sz="1600" dirty="0" smtClean="0">
-                <a:solidFill>
-                  <a:srgbClr val="FFFFFF"/>
-                </a:solidFill>
-              </a:rPr>
-              <a:t>2. Asset size</a:t>
-            </a:r>
-          </a:p>
-          <a:p>
-            <a:r>
-              <a:rPr lang="en-US" sz="1600" dirty="0" smtClean="0">
-                <a:solidFill>
-                  <a:srgbClr val="FFFFFF"/>
-                </a:solidFill>
-              </a:rPr>
               <a:t>3. Revenue by payer type</a:t>
             </a:r>
           </a:p>
           <a:p>
             <a:r>
-              <a:rPr lang="en-US" sz="1600" dirty="0" smtClean="0">
+              <a:rPr lang="en-US" sz="1600" dirty="0">
                 <a:solidFill>
                   <a:srgbClr val="FFFFFF"/>
                 </a:solidFill>
@@ -11759,7 +12235,7 @@
           </a:p>
           <a:p>
             <a:r>
-              <a:rPr lang="en-US" sz="1600" dirty="0" smtClean="0">
+              <a:rPr lang="en-US" sz="1600" dirty="0">
                 <a:solidFill>
                   <a:srgbClr val="FFFFFF"/>
                 </a:solidFill>
@@ -11769,34 +12245,13 @@
           </a:p>
           <a:p>
             <a:r>
-              <a:rPr lang="en-US" sz="1600" dirty="0" smtClean="0">
-                <a:solidFill>
-                  <a:srgbClr val="FFFFFF"/>
-                </a:solidFill>
-              </a:rPr>
-              <a:t>Hospital </a:t>
-            </a:r>
-            <a:r>
               <a:rPr lang="en-US" sz="1600" dirty="0">
                 <a:solidFill>
                   <a:srgbClr val="FFFFFF"/>
                 </a:solidFill>
               </a:rPr>
-              <a:t>Annual Financial Data - State of California, Department of Health Care Access and </a:t>
+              <a:t>Hospital Annual Financial Data - State of California, Department of Health Care Access and Information, 2022.</a:t>
             </a:r>
-            <a:r>
-              <a:rPr lang="en-US" sz="1600" dirty="0" smtClean="0">
-                <a:solidFill>
-                  <a:srgbClr val="FFFFFF"/>
-                </a:solidFill>
-              </a:rPr>
-              <a:t>Information, 2022.</a:t>
-            </a:r>
-            <a:endParaRPr lang="en-US" sz="1600" dirty="0">
-              <a:solidFill>
-                <a:srgbClr val="FFFFFF"/>
-              </a:solidFill>
-            </a:endParaRPr>
           </a:p>
         </p:txBody>
       </p:sp>
@@ -11848,7 +12303,7 @@
             <a:blip r:embed="rId7">
               <a:extLst>
                 <a:ext uri="{96DAC541-7B7A-43D3-8B79-37D633B846F1}">
-                  <asvg:svgBlip xmlns="" xmlns:dgm="http://schemas.openxmlformats.org/drawingml/2006/diagram" xmlns:asvg="http://schemas.microsoft.com/office/drawing/2016/SVG/main" xmlns:lc="http://schemas.openxmlformats.org/drawingml/2006/lockedCanvas" r:embed="rId8"/>
+                  <asvg:svgBlip xmlns:asvg="http://schemas.microsoft.com/office/drawing/2016/SVG/main" r:embed="rId8"/>
                 </a:ext>
               </a:extLst>
             </a:blip>
@@ -11882,6 +12337,13 @@
             <a:schemeClr val="lt1"/>
           </a:fontRef>
         </p:style>
+        <p:txBody>
+          <a:bodyPr/>
+          <a:lstStyle/>
+          <a:p>
+            <a:endParaRPr lang="en-US"/>
+          </a:p>
+        </p:txBody>
       </p:sp>
       <p:grpSp>
         <p:nvGrpSpPr>
@@ -11949,6 +12411,13 @@
               </a:schemeClr>
             </a:fontRef>
           </p:style>
+          <p:txBody>
+            <a:bodyPr/>
+            <a:lstStyle/>
+            <a:p>
+              <a:endParaRPr lang="en-US"/>
+            </a:p>
+          </p:txBody>
         </p:sp>
         <p:sp>
           <p:nvSpPr>
@@ -12006,10 +12475,9 @@
                 <a:t>6</a:t>
               </a:r>
               <a:r>
-                <a:rPr lang="en-US" sz="1700" kern="1200" dirty="0" smtClean="0"/>
+                <a:rPr lang="en-US" sz="1700" kern="1200" dirty="0"/>
                 <a:t> Types of Care</a:t>
               </a:r>
-              <a:endParaRPr lang="en-US" sz="1700" kern="1200" dirty="0"/>
             </a:p>
           </p:txBody>
         </p:sp>
@@ -12032,7 +12500,7 @@
             <a:blip r:embed="rId9">
               <a:extLst>
                 <a:ext uri="{96DAC541-7B7A-43D3-8B79-37D633B846F1}">
-                  <asvg:svgBlip xmlns="" xmlns:dgm="http://schemas.openxmlformats.org/drawingml/2006/diagram" xmlns:asvg="http://schemas.microsoft.com/office/drawing/2016/SVG/main" xmlns:lc="http://schemas.openxmlformats.org/drawingml/2006/lockedCanvas" r:embed="rId10"/>
+                  <asvg:svgBlip xmlns:asvg="http://schemas.microsoft.com/office/drawing/2016/SVG/main" r:embed="rId10"/>
                 </a:ext>
               </a:extLst>
             </a:blip>
@@ -12066,6 +12534,13 @@
             <a:schemeClr val="lt1"/>
           </a:fontRef>
         </p:style>
+        <p:txBody>
+          <a:bodyPr/>
+          <a:lstStyle/>
+          <a:p>
+            <a:endParaRPr lang="en-US"/>
+          </a:p>
+        </p:txBody>
       </p:sp>
       <p:grpSp>
         <p:nvGrpSpPr>
@@ -12133,6 +12608,13 @@
               </a:schemeClr>
             </a:fontRef>
           </p:style>
+          <p:txBody>
+            <a:bodyPr/>
+            <a:lstStyle/>
+            <a:p>
+              <a:endParaRPr lang="en-US"/>
+            </a:p>
+          </p:txBody>
         </p:sp>
         <p:sp>
           <p:nvSpPr>
@@ -12211,7 +12693,7 @@
             <a:blip r:embed="rId11">
               <a:extLst>
                 <a:ext uri="{96DAC541-7B7A-43D3-8B79-37D633B846F1}">
-                  <asvg:svgBlip xmlns="" xmlns:dgm="http://schemas.openxmlformats.org/drawingml/2006/diagram" xmlns:asvg="http://schemas.microsoft.com/office/drawing/2016/SVG/main" xmlns:lc="http://schemas.openxmlformats.org/drawingml/2006/lockedCanvas" r:embed="rId12"/>
+                  <asvg:svgBlip xmlns:asvg="http://schemas.microsoft.com/office/drawing/2016/SVG/main" r:embed="rId12"/>
                 </a:ext>
               </a:extLst>
             </a:blip>
@@ -12245,6 +12727,13 @@
             <a:schemeClr val="lt1"/>
           </a:fontRef>
         </p:style>
+        <p:txBody>
+          <a:bodyPr/>
+          <a:lstStyle/>
+          <a:p>
+            <a:endParaRPr lang="en-US"/>
+          </a:p>
+        </p:txBody>
       </p:sp>
       <p:grpSp>
         <p:nvGrpSpPr>
@@ -12312,6 +12801,13 @@
               </a:schemeClr>
             </a:fontRef>
           </p:style>
+          <p:txBody>
+            <a:bodyPr/>
+            <a:lstStyle/>
+            <a:p>
+              <a:endParaRPr lang="en-US"/>
+            </a:p>
+          </p:txBody>
         </p:sp>
         <p:sp>
           <p:nvSpPr>
@@ -12365,10 +12861,9 @@
                 </a:spcAft>
               </a:pPr>
               <a:r>
-                <a:rPr lang="en-US" sz="1700" kern="1200" dirty="0" smtClean="0"/>
+                <a:rPr lang="en-US" sz="1700" kern="1200" dirty="0"/>
                 <a:t>$248.5B in Combined Total Assets</a:t>
               </a:r>
-              <a:endParaRPr lang="en-US" sz="1700" kern="1200" dirty="0"/>
             </a:p>
           </p:txBody>
         </p:sp>
@@ -12419,7 +12914,7 @@
                 <a16:creationId xmlns:a16="http://schemas.microsoft.com/office/drawing/2014/main" id="{681577AD-DA5F-48B3-8FB9-5199BA9EE681}"/>
               </a:ext>
               <a:ext uri="{C183D7F6-B498-43B3-948B-1728B52AA6E4}">
-                <adec:decorative xmlns:adec="http://schemas.microsoft.com/office/drawing/2017/decorative" xmlns="" val="1"/>
+                <adec:decorative xmlns:adec="http://schemas.microsoft.com/office/drawing/2017/decorative" val="1"/>
               </a:ext>
             </a:extLst>
           </p:cNvPr>
@@ -12502,10 +12997,9 @@
           <a:lstStyle/>
           <a:p>
             <a:r>
-              <a:rPr lang="en-US" dirty="0" smtClean="0"/>
+              <a:rPr lang="en-US" dirty="0"/>
               <a:t>Tech Stack</a:t>
             </a:r>
-            <a:endParaRPr lang="en-US" dirty="0"/>
           </a:p>
         </p:txBody>
       </p:sp>
@@ -12538,7 +13032,7 @@
           <a:lstStyle/>
           <a:p>
             <a:r>
-              <a:rPr lang="en-US" sz="1600" dirty="0" smtClean="0">
+              <a:rPr lang="en-US" sz="1600" dirty="0">
                 <a:solidFill>
                   <a:srgbClr val="FFFFFF"/>
                 </a:solidFill>
@@ -12548,7 +13042,7 @@
           </a:p>
           <a:p>
             <a:r>
-              <a:rPr lang="en-US" sz="1600" dirty="0" smtClean="0">
+              <a:rPr lang="en-US" sz="1600" dirty="0">
                 <a:solidFill>
                   <a:srgbClr val="FFFFFF"/>
                 </a:solidFill>
@@ -12558,7 +13052,7 @@
           </a:p>
           <a:p>
             <a:r>
-              <a:rPr lang="en-US" sz="1600" dirty="0" smtClean="0">
+              <a:rPr lang="en-US" sz="1600" dirty="0">
                 <a:solidFill>
                   <a:srgbClr val="FFFFFF"/>
                 </a:solidFill>
@@ -12568,7 +13062,7 @@
           </a:p>
           <a:p>
             <a:r>
-              <a:rPr lang="en-US" sz="1600" dirty="0" smtClean="0">
+              <a:rPr lang="en-US" sz="1600" dirty="0">
                 <a:solidFill>
                   <a:srgbClr val="FFFFFF"/>
                 </a:solidFill>
@@ -12578,7 +13072,7 @@
           </a:p>
           <a:p>
             <a:r>
-              <a:rPr lang="en-US" sz="1600" dirty="0" smtClean="0">
+              <a:rPr lang="en-US" sz="1600" dirty="0">
                 <a:solidFill>
                   <a:srgbClr val="FFFFFF"/>
                 </a:solidFill>
@@ -12588,7 +13082,7 @@
           </a:p>
           <a:p>
             <a:r>
-              <a:rPr lang="en-US" sz="1600" dirty="0" smtClean="0">
+              <a:rPr lang="en-US" sz="1600" dirty="0">
                 <a:solidFill>
                   <a:srgbClr val="FFFFFF"/>
                 </a:solidFill>
@@ -12598,7 +13092,7 @@
           </a:p>
           <a:p>
             <a:r>
-              <a:rPr lang="en-US" sz="1600" dirty="0" smtClean="0">
+              <a:rPr lang="en-US" sz="1600" dirty="0">
                 <a:solidFill>
                   <a:srgbClr val="FFFFFF"/>
                 </a:solidFill>
@@ -12900,7 +13394,7 @@
                 <a16:creationId xmlns:a16="http://schemas.microsoft.com/office/drawing/2014/main" id="{681577AD-DA5F-48B3-8FB9-5199BA9EE681}"/>
               </a:ext>
               <a:ext uri="{C183D7F6-B498-43B3-948B-1728B52AA6E4}">
-                <adec:decorative xmlns:adec="http://schemas.microsoft.com/office/drawing/2017/decorative" xmlns="" val="1"/>
+                <adec:decorative xmlns:adec="http://schemas.microsoft.com/office/drawing/2017/decorative" val="1"/>
               </a:ext>
             </a:extLst>
           </p:cNvPr>
@@ -13013,37 +13507,72 @@
         </p:spPr>
         <p:txBody>
           <a:bodyPr anchor="t">
-            <a:normAutofit/>
+            <a:normAutofit fontScale="92500" lnSpcReduction="20000"/>
           </a:bodyPr>
           <a:lstStyle/>
           <a:p>
+            <a:pPr marL="0" indent="0">
+              <a:buNone/>
+            </a:pPr>
             <a:r>
               <a:rPr lang="en-US" dirty="0">
                 <a:solidFill>
                   <a:srgbClr val="FFFFFF"/>
                 </a:solidFill>
               </a:rPr>
-              <a:t>&lt;&lt;Add Analysis&gt;&gt;</a:t>
+              <a:t>The size of the hospital was determined by comparing total assets. </a:t>
             </a:r>
           </a:p>
           <a:p>
-            <a:endParaRPr lang="en-US" dirty="0">
-              <a:solidFill>
-                <a:srgbClr val="FFFFFF"/>
-              </a:solidFill>
-            </a:endParaRPr>
-          </a:p>
-          <a:p>
+            <a:pPr marL="0" indent="0">
+              <a:buNone/>
+            </a:pPr>
             <a:r>
               <a:rPr lang="en-US" dirty="0">
                 <a:solidFill>
                   <a:srgbClr val="FFFFFF"/>
                 </a:solidFill>
               </a:rPr>
-              <a:t>Note for Greg:</a:t>
+              <a:t>Larger hospitals are teaching or corporate and located in metro areas.</a:t>
             </a:r>
           </a:p>
           <a:p>
+            <a:pPr marL="0" indent="0">
+              <a:buNone/>
+            </a:pPr>
+            <a:endParaRPr lang="en-US" dirty="0">
+              <a:solidFill>
+                <a:srgbClr val="FFFFFF"/>
+              </a:solidFill>
+            </a:endParaRPr>
+          </a:p>
+          <a:p>
+            <a:pPr marL="0" indent="0">
+              <a:buNone/>
+            </a:pPr>
+            <a:r>
+              <a:rPr lang="en-US" dirty="0">
+                <a:solidFill>
+                  <a:srgbClr val="FFFFFF"/>
+                </a:solidFill>
+              </a:rPr>
+              <a:t>Smaller hospitals are rural or concentrate on a specialty.</a:t>
+            </a:r>
+          </a:p>
+          <a:p>
+            <a:pPr marL="0" indent="0">
+              <a:buNone/>
+            </a:pPr>
+            <a:endParaRPr lang="en-US" dirty="0">
+              <a:solidFill>
+                <a:srgbClr val="FFFFFF"/>
+              </a:solidFill>
+            </a:endParaRPr>
+          </a:p>
+          <a:p>
+            <a:pPr marL="0" indent="0">
+              <a:buNone/>
+            </a:pPr>
             <a:r>
               <a:rPr lang="en-US" dirty="0">
                 <a:solidFill>
@@ -13054,6 +13583,9 @@
             </a:r>
           </a:p>
           <a:p>
+            <a:pPr marL="0" indent="0">
+              <a:buNone/>
+            </a:pPr>
             <a:r>
               <a:rPr lang="en-US" dirty="0">
                 <a:solidFill>
@@ -13111,6 +13643,566 @@
 <file path=ppt/slides/slide7.xml><?xml version="1.0" encoding="utf-8"?>
 <p:sld xmlns:a="http://schemas.openxmlformats.org/drawingml/2006/main" xmlns:r="http://schemas.openxmlformats.org/officeDocument/2006/relationships" xmlns:p="http://schemas.openxmlformats.org/presentationml/2006/main">
   <p:cSld>
+    <p:spTree>
+      <p:nvGrpSpPr>
+        <p:cNvPr id="1" name=""/>
+        <p:cNvGrpSpPr/>
+        <p:nvPr/>
+      </p:nvGrpSpPr>
+      <p:grpSpPr>
+        <a:xfrm>
+          <a:off x="0" y="0"/>
+          <a:ext cx="0" cy="0"/>
+          <a:chOff x="0" y="0"/>
+          <a:chExt cx="0" cy="0"/>
+        </a:xfrm>
+      </p:grpSpPr>
+      <p:sp>
+        <p:nvSpPr>
+          <p:cNvPr id="2" name="Title 1">
+            <a:extLst>
+              <a:ext uri="{FF2B5EF4-FFF2-40B4-BE49-F238E27FC236}">
+                <a16:creationId xmlns:a16="http://schemas.microsoft.com/office/drawing/2014/main" id="{0265F446-7FD0-00CA-EBB4-140431946EA9}"/>
+              </a:ext>
+            </a:extLst>
+          </p:cNvPr>
+          <p:cNvSpPr>
+            <a:spLocks noGrp="1"/>
+          </p:cNvSpPr>
+          <p:nvPr>
+            <p:ph type="title"/>
+          </p:nvPr>
+        </p:nvSpPr>
+        <p:spPr>
+          <a:xfrm>
+            <a:off x="560490" y="1128408"/>
+            <a:ext cx="2265837" cy="4601183"/>
+          </a:xfrm>
+        </p:spPr>
+        <p:txBody>
+          <a:bodyPr>
+            <a:normAutofit fontScale="90000"/>
+          </a:bodyPr>
+          <a:lstStyle/>
+          <a:p>
+            <a:br>
+              <a:rPr lang="en-US" sz="1200" dirty="0"/>
+            </a:br>
+            <a:br>
+              <a:rPr lang="en-US" sz="1200" dirty="0"/>
+            </a:br>
+            <a:br>
+              <a:rPr lang="en-US" sz="1200" dirty="0"/>
+            </a:br>
+            <a:br>
+              <a:rPr lang="en-US" sz="1200" dirty="0"/>
+            </a:br>
+            <a:br>
+              <a:rPr lang="en-US" sz="1200" dirty="0"/>
+            </a:br>
+            <a:br>
+              <a:rPr lang="en-US" sz="1200" dirty="0"/>
+            </a:br>
+            <a:r>
+              <a:rPr lang="en-US" sz="1200" dirty="0"/>
+              <a:t>Top 10 Facilities – Acute Care</a:t>
+            </a:r>
+            <a:br>
+              <a:rPr lang="en-US" sz="1200" dirty="0"/>
+            </a:br>
+            <a:br>
+              <a:rPr lang="en-US" sz="1200" dirty="0"/>
+            </a:br>
+            <a:r>
+              <a:rPr lang="en-US" sz="1200" dirty="0"/>
+              <a:t>Medicare Trad – 	                      18.12%</a:t>
+            </a:r>
+            <a:br>
+              <a:rPr lang="en-US" sz="1200" dirty="0"/>
+            </a:br>
+            <a:r>
+              <a:rPr lang="en-US" sz="1200" dirty="0"/>
+              <a:t>Medicare MC  – 	                         7.34%</a:t>
+            </a:r>
+            <a:br>
+              <a:rPr lang="en-US" sz="1200" dirty="0"/>
+            </a:br>
+            <a:r>
+              <a:rPr lang="en-US" sz="1200" dirty="0"/>
+              <a:t>Medi Cal Trad – 	                        5.63%</a:t>
+            </a:r>
+            <a:br>
+              <a:rPr lang="en-US" sz="1200" dirty="0"/>
+            </a:br>
+            <a:r>
+              <a:rPr lang="en-US" sz="1200" dirty="0"/>
+              <a:t>Medi Cal MC – 	                         9.81%</a:t>
+            </a:r>
+            <a:br>
+              <a:rPr lang="en-US" sz="1200" dirty="0"/>
+            </a:br>
+            <a:r>
+              <a:rPr lang="en-US" sz="1200" dirty="0"/>
+              <a:t>County Indigent –                          0.70%</a:t>
+            </a:r>
+            <a:br>
+              <a:rPr lang="en-US" sz="1200" dirty="0"/>
+            </a:br>
+            <a:r>
+              <a:rPr lang="en-US" sz="1200" dirty="0"/>
+              <a:t>Third Part Trad – 	                         3.60%</a:t>
+            </a:r>
+            <a:br>
+              <a:rPr lang="en-US" sz="1200" dirty="0"/>
+            </a:br>
+            <a:r>
+              <a:rPr lang="en-US" sz="1200" dirty="0"/>
+              <a:t>Third Part MC – 	                      53.54%</a:t>
+            </a:r>
+            <a:br>
+              <a:rPr lang="en-US" sz="1200" dirty="0"/>
+            </a:br>
+            <a:r>
+              <a:rPr lang="en-US" sz="1200" dirty="0"/>
+              <a:t>Other Indigent –  	                        0.06%</a:t>
+            </a:r>
+            <a:br>
+              <a:rPr lang="en-US" sz="1200" dirty="0"/>
+            </a:br>
+            <a:r>
+              <a:rPr lang="en-US" sz="1200" dirty="0"/>
+              <a:t>Other – 	                        1.20%</a:t>
+            </a:r>
+            <a:br>
+              <a:rPr lang="en-US" sz="800" dirty="0"/>
+            </a:br>
+            <a:br>
+              <a:rPr lang="en-US" sz="800" dirty="0"/>
+            </a:br>
+            <a:br>
+              <a:rPr lang="en-US" sz="800" dirty="0"/>
+            </a:br>
+            <a:br>
+              <a:rPr lang="en-US" sz="800" dirty="0"/>
+            </a:br>
+            <a:br>
+              <a:rPr lang="en-US" sz="800" dirty="0"/>
+            </a:br>
+            <a:br>
+              <a:rPr lang="en-US" sz="800" dirty="0"/>
+            </a:br>
+            <a:br>
+              <a:rPr lang="en-US" sz="800" dirty="0"/>
+            </a:br>
+            <a:r>
+              <a:rPr lang="en-US" sz="1200" dirty="0"/>
+              <a:t>Bottom 10 Facilities – Acute Care</a:t>
+            </a:r>
+            <a:br>
+              <a:rPr lang="en-US" sz="1200" dirty="0"/>
+            </a:br>
+            <a:br>
+              <a:rPr lang="en-US" sz="1200" dirty="0"/>
+            </a:br>
+            <a:r>
+              <a:rPr lang="en-US" sz="1200" dirty="0"/>
+              <a:t>Medicare Trad – 	                      25.97%</a:t>
+            </a:r>
+            <a:br>
+              <a:rPr lang="en-US" sz="1200" dirty="0"/>
+            </a:br>
+            <a:r>
+              <a:rPr lang="en-US" sz="1200" dirty="0"/>
+              <a:t>Medicare MC  – 	                       9.99%</a:t>
+            </a:r>
+            <a:br>
+              <a:rPr lang="en-US" sz="1200" dirty="0"/>
+            </a:br>
+            <a:r>
+              <a:rPr lang="en-US" sz="1200" dirty="0"/>
+              <a:t>Medi Cal Trad – 	                    13.49%</a:t>
+            </a:r>
+            <a:br>
+              <a:rPr lang="en-US" sz="1200" dirty="0"/>
+            </a:br>
+            <a:r>
+              <a:rPr lang="en-US" sz="1200" dirty="0"/>
+              <a:t>Medi Cal MC – 	                    20.43%</a:t>
+            </a:r>
+            <a:br>
+              <a:rPr lang="en-US" sz="1200" dirty="0"/>
+            </a:br>
+            <a:r>
+              <a:rPr lang="en-US" sz="1200" dirty="0"/>
+              <a:t>County Indigent –                       0.52%</a:t>
+            </a:r>
+            <a:br>
+              <a:rPr lang="en-US" sz="1200" dirty="0"/>
+            </a:br>
+            <a:r>
+              <a:rPr lang="en-US" sz="1200" dirty="0"/>
+              <a:t>Third Part Trad – 	                    16.78%</a:t>
+            </a:r>
+            <a:br>
+              <a:rPr lang="en-US" sz="1200" dirty="0"/>
+            </a:br>
+            <a:r>
+              <a:rPr lang="en-US" sz="1200" dirty="0"/>
+              <a:t>Third Part MC – 	                      6.66%</a:t>
+            </a:r>
+            <a:br>
+              <a:rPr lang="en-US" sz="1200" dirty="0"/>
+            </a:br>
+            <a:r>
+              <a:rPr lang="en-US" sz="1200" dirty="0"/>
+              <a:t>Other Indigent –  	                      </a:t>
+            </a:r>
+            <a:r>
+              <a:rPr lang="en-US" sz="1200" dirty="0" err="1"/>
+              <a:t>o.oo</a:t>
+            </a:r>
+            <a:r>
+              <a:rPr lang="en-US" sz="1200" dirty="0"/>
+              <a:t>%</a:t>
+            </a:r>
+            <a:br>
+              <a:rPr lang="en-US" sz="1200" dirty="0"/>
+            </a:br>
+            <a:r>
+              <a:rPr lang="en-US" sz="1200" dirty="0"/>
+              <a:t>Other – 	                      6.16%</a:t>
+            </a:r>
+            <a:br>
+              <a:rPr lang="en-US" dirty="0"/>
+            </a:br>
+            <a:br>
+              <a:rPr lang="en-US" dirty="0"/>
+            </a:br>
+            <a:endParaRPr lang="en-US" dirty="0"/>
+          </a:p>
+        </p:txBody>
+      </p:sp>
+      <p:pic>
+        <p:nvPicPr>
+          <p:cNvPr id="6" name="Picture 5" descr="A pie chart with different colored circles&#10;&#10;Description automatically generated">
+            <a:extLst>
+              <a:ext uri="{FF2B5EF4-FFF2-40B4-BE49-F238E27FC236}">
+                <a16:creationId xmlns:a16="http://schemas.microsoft.com/office/drawing/2014/main" id="{E937D825-8658-D1EC-E628-FA024297938E}"/>
+              </a:ext>
+            </a:extLst>
+          </p:cNvPr>
+          <p:cNvPicPr>
+            <a:picLocks noChangeAspect="1"/>
+          </p:cNvPicPr>
+          <p:nvPr/>
+        </p:nvPicPr>
+        <p:blipFill>
+          <a:blip r:embed="rId2"/>
+          <a:stretch>
+            <a:fillRect/>
+          </a:stretch>
+        </p:blipFill>
+        <p:spPr>
+          <a:xfrm>
+            <a:off x="3849434" y="3618420"/>
+            <a:ext cx="6858000" cy="3081020"/>
+          </a:xfrm>
+          <a:prstGeom prst="rect">
+            <a:avLst/>
+          </a:prstGeom>
+        </p:spPr>
+      </p:pic>
+      <p:pic>
+        <p:nvPicPr>
+          <p:cNvPr id="9" name="Content Placeholder 8">
+            <a:extLst>
+              <a:ext uri="{FF2B5EF4-FFF2-40B4-BE49-F238E27FC236}">
+                <a16:creationId xmlns:a16="http://schemas.microsoft.com/office/drawing/2014/main" id="{5BC8AE8F-D8BB-18E0-25DD-C1130606F5AD}"/>
+              </a:ext>
+            </a:extLst>
+          </p:cNvPr>
+          <p:cNvPicPr>
+            <a:picLocks noGrp="1" noChangeAspect="1"/>
+          </p:cNvPicPr>
+          <p:nvPr>
+            <p:ph idx="1"/>
+          </p:nvPr>
+        </p:nvPicPr>
+        <p:blipFill>
+          <a:blip r:embed="rId3"/>
+          <a:stretch>
+            <a:fillRect/>
+          </a:stretch>
+        </p:blipFill>
+        <p:spPr>
+          <a:xfrm>
+            <a:off x="3849434" y="470981"/>
+            <a:ext cx="6388100" cy="2768600"/>
+          </a:xfrm>
+          <a:prstGeom prst="rect">
+            <a:avLst/>
+          </a:prstGeom>
+        </p:spPr>
+      </p:pic>
+    </p:spTree>
+    <p:extLst>
+      <p:ext uri="{BB962C8B-B14F-4D97-AF65-F5344CB8AC3E}">
+        <p14:creationId xmlns:p14="http://schemas.microsoft.com/office/powerpoint/2010/main" val="1960104821"/>
+      </p:ext>
+    </p:extLst>
+  </p:cSld>
+  <p:clrMapOvr>
+    <a:masterClrMapping/>
+  </p:clrMapOvr>
+</p:sld>
+</file>
+
+<file path=ppt/slides/slide8.xml><?xml version="1.0" encoding="utf-8"?>
+<p:sld xmlns:a="http://schemas.openxmlformats.org/drawingml/2006/main" xmlns:r="http://schemas.openxmlformats.org/officeDocument/2006/relationships" xmlns:p="http://schemas.openxmlformats.org/presentationml/2006/main">
+  <p:cSld>
+    <p:spTree>
+      <p:nvGrpSpPr>
+        <p:cNvPr id="1" name=""/>
+        <p:cNvGrpSpPr/>
+        <p:nvPr/>
+      </p:nvGrpSpPr>
+      <p:grpSpPr>
+        <a:xfrm>
+          <a:off x="0" y="0"/>
+          <a:ext cx="0" cy="0"/>
+          <a:chOff x="0" y="0"/>
+          <a:chExt cx="0" cy="0"/>
+        </a:xfrm>
+      </p:grpSpPr>
+      <p:sp>
+        <p:nvSpPr>
+          <p:cNvPr id="2" name="Title 1">
+            <a:extLst>
+              <a:ext uri="{FF2B5EF4-FFF2-40B4-BE49-F238E27FC236}">
+                <a16:creationId xmlns:a16="http://schemas.microsoft.com/office/drawing/2014/main" id="{CDF3B1AE-3276-CD1A-6E3A-2C018401D580}"/>
+              </a:ext>
+            </a:extLst>
+          </p:cNvPr>
+          <p:cNvSpPr>
+            <a:spLocks noGrp="1"/>
+          </p:cNvSpPr>
+          <p:nvPr>
+            <p:ph type="title"/>
+          </p:nvPr>
+        </p:nvSpPr>
+        <p:spPr/>
+        <p:txBody>
+          <a:bodyPr>
+            <a:normAutofit/>
+          </a:bodyPr>
+          <a:lstStyle/>
+          <a:p>
+            <a:r>
+              <a:rPr lang="en-US" sz="1100" dirty="0"/>
+              <a:t>Top 10  Fac. Acute Discharges – Average by Type</a:t>
+            </a:r>
+            <a:br>
+              <a:rPr lang="en-US" sz="1100" dirty="0"/>
+            </a:br>
+            <a:br>
+              <a:rPr lang="en-US" sz="1100" dirty="0"/>
+            </a:br>
+            <a:r>
+              <a:rPr lang="en-US" sz="1100" dirty="0"/>
+              <a:t>Acute		29,774 </a:t>
+            </a:r>
+            <a:br>
+              <a:rPr lang="en-US" sz="1100" dirty="0"/>
+            </a:br>
+            <a:r>
+              <a:rPr lang="en-US" sz="1100" dirty="0"/>
+              <a:t>Psychiatric		      737</a:t>
+            </a:r>
+            <a:br>
+              <a:rPr lang="en-US" sz="1100" dirty="0"/>
+            </a:br>
+            <a:r>
+              <a:rPr lang="en-US" sz="1100" dirty="0"/>
+              <a:t>Chemical Dependency	      774</a:t>
+            </a:r>
+            <a:br>
+              <a:rPr lang="en-US" sz="1100" dirty="0"/>
+            </a:br>
+            <a:r>
+              <a:rPr lang="en-US" sz="1100" dirty="0"/>
+              <a:t>Rehabilitation		     685</a:t>
+            </a:r>
+            <a:br>
+              <a:rPr lang="en-US" sz="1100" dirty="0"/>
+            </a:br>
+            <a:r>
+              <a:rPr lang="en-US" sz="1100" dirty="0"/>
+              <a:t>Long-Term Care		       -- </a:t>
+            </a:r>
+            <a:br>
+              <a:rPr lang="en-US" sz="1100" dirty="0"/>
+            </a:br>
+            <a:r>
+              <a:rPr lang="en-US" sz="1100" dirty="0"/>
+              <a:t>Residential / Daily Care	       --</a:t>
+            </a:r>
+            <a:br>
+              <a:rPr lang="en-US" sz="1100" dirty="0"/>
+            </a:br>
+            <a:br>
+              <a:rPr lang="en-US" sz="1100" dirty="0"/>
+            </a:br>
+            <a:br>
+              <a:rPr lang="en-US" sz="1100" dirty="0"/>
+            </a:br>
+            <a:br>
+              <a:rPr lang="en-US" sz="1100" dirty="0"/>
+            </a:br>
+            <a:br>
+              <a:rPr lang="en-US" sz="1100" dirty="0"/>
+            </a:br>
+            <a:br>
+              <a:rPr lang="en-US" sz="1100" dirty="0"/>
+            </a:br>
+            <a:br>
+              <a:rPr lang="en-US" sz="1100" dirty="0"/>
+            </a:br>
+            <a:br>
+              <a:rPr lang="en-US" sz="1100" dirty="0"/>
+            </a:br>
+            <a:br>
+              <a:rPr lang="en-US" sz="1100" dirty="0"/>
+            </a:br>
+            <a:r>
+              <a:rPr lang="en-US" sz="1100" dirty="0"/>
+              <a:t>Bottom 10  Fac. Acute Discharges – Average by Type</a:t>
+            </a:r>
+            <a:br>
+              <a:rPr lang="en-US" sz="1100" dirty="0"/>
+            </a:br>
+            <a:br>
+              <a:rPr lang="en-US" sz="1100" dirty="0"/>
+            </a:br>
+            <a:r>
+              <a:rPr lang="en-US" sz="1100" dirty="0"/>
+              <a:t>Acute		     434</a:t>
+            </a:r>
+            <a:br>
+              <a:rPr lang="en-US" sz="1100" dirty="0"/>
+            </a:br>
+            <a:r>
+              <a:rPr lang="en-US" sz="1100" dirty="0"/>
+              <a:t>Psychiatric		      105</a:t>
+            </a:r>
+            <a:br>
+              <a:rPr lang="en-US" sz="1100" dirty="0"/>
+            </a:br>
+            <a:r>
+              <a:rPr lang="en-US" sz="1100" dirty="0"/>
+              <a:t>Chemical Dependency	       --</a:t>
+            </a:r>
+            <a:br>
+              <a:rPr lang="en-US" sz="1100" dirty="0"/>
+            </a:br>
+            <a:r>
+              <a:rPr lang="en-US" sz="1100" dirty="0"/>
+              <a:t>Rehabilitation		       --</a:t>
+            </a:r>
+            <a:br>
+              <a:rPr lang="en-US" sz="1100" dirty="0"/>
+            </a:br>
+            <a:r>
+              <a:rPr lang="en-US" sz="1100" dirty="0"/>
+              <a:t>Long-Term Care		      112 </a:t>
+            </a:r>
+            <a:br>
+              <a:rPr lang="en-US" sz="1100" dirty="0"/>
+            </a:br>
+            <a:r>
+              <a:rPr lang="en-US" sz="1100" dirty="0"/>
+              <a:t>Residential / Daily Care	       --</a:t>
+            </a:r>
+          </a:p>
+        </p:txBody>
+      </p:sp>
+      <p:pic>
+        <p:nvPicPr>
+          <p:cNvPr id="4" name="Content Placeholder 3">
+            <a:extLst>
+              <a:ext uri="{FF2B5EF4-FFF2-40B4-BE49-F238E27FC236}">
+                <a16:creationId xmlns:a16="http://schemas.microsoft.com/office/drawing/2014/main" id="{CFD59C2C-61DF-FA8D-4061-90ACAC7BB478}"/>
+              </a:ext>
+            </a:extLst>
+          </p:cNvPr>
+          <p:cNvPicPr>
+            <a:picLocks noGrp="1" noChangeAspect="1"/>
+          </p:cNvPicPr>
+          <p:nvPr>
+            <p:ph idx="1"/>
+          </p:nvPr>
+        </p:nvPicPr>
+        <p:blipFill>
+          <a:blip r:embed="rId2"/>
+          <a:stretch>
+            <a:fillRect/>
+          </a:stretch>
+        </p:blipFill>
+        <p:spPr>
+          <a:xfrm>
+            <a:off x="3827174" y="311438"/>
+            <a:ext cx="6263742" cy="3238098"/>
+          </a:xfrm>
+          <a:prstGeom prst="rect">
+            <a:avLst/>
+          </a:prstGeom>
+        </p:spPr>
+      </p:pic>
+      <p:pic>
+        <p:nvPicPr>
+          <p:cNvPr id="6" name="Picture 5">
+            <a:extLst>
+              <a:ext uri="{FF2B5EF4-FFF2-40B4-BE49-F238E27FC236}">
+                <a16:creationId xmlns:a16="http://schemas.microsoft.com/office/drawing/2014/main" id="{3F6FAD57-5BBC-C7EE-A9CC-8ECAB7010A98}"/>
+              </a:ext>
+            </a:extLst>
+          </p:cNvPr>
+          <p:cNvPicPr>
+            <a:picLocks noChangeAspect="1"/>
+          </p:cNvPicPr>
+          <p:nvPr/>
+        </p:nvPicPr>
+        <p:blipFill>
+          <a:blip r:embed="rId3"/>
+          <a:stretch>
+            <a:fillRect/>
+          </a:stretch>
+        </p:blipFill>
+        <p:spPr>
+          <a:xfrm>
+            <a:off x="3996762" y="3549536"/>
+            <a:ext cx="5762799" cy="3043198"/>
+          </a:xfrm>
+          <a:prstGeom prst="rect">
+            <a:avLst/>
+          </a:prstGeom>
+        </p:spPr>
+      </p:pic>
+    </p:spTree>
+    <p:extLst>
+      <p:ext uri="{BB962C8B-B14F-4D97-AF65-F5344CB8AC3E}">
+        <p14:creationId xmlns:p14="http://schemas.microsoft.com/office/powerpoint/2010/main" val="1269476491"/>
+      </p:ext>
+    </p:extLst>
+  </p:cSld>
+  <p:clrMapOvr>
+    <a:masterClrMapping/>
+  </p:clrMapOvr>
+</p:sld>
+</file>
+
+<file path=ppt/slides/slide9.xml><?xml version="1.0" encoding="utf-8"?>
+<p:sld xmlns:a="http://schemas.openxmlformats.org/drawingml/2006/main" xmlns:r="http://schemas.openxmlformats.org/officeDocument/2006/relationships" xmlns:p="http://schemas.openxmlformats.org/presentationml/2006/main">
+  <p:cSld>
     <p:bg>
       <p:bgPr>
         <a:solidFill>
@@ -13141,7 +14233,7 @@
                 <a16:creationId xmlns:a16="http://schemas.microsoft.com/office/drawing/2014/main" id="{681577AD-DA5F-48B3-8FB9-5199BA9EE681}"/>
               </a:ext>
               <a:ext uri="{C183D7F6-B498-43B3-948B-1728B52AA6E4}">
-                <adec:decorative xmlns:adec="http://schemas.microsoft.com/office/drawing/2017/decorative" xmlns="" val="1"/>
+                <adec:decorative xmlns:adec="http://schemas.microsoft.com/office/drawing/2017/decorative" val="1"/>
               </a:ext>
             </a:extLst>
           </p:cNvPr>
@@ -13224,16 +14316,8 @@
           <a:lstStyle/>
           <a:p>
             <a:r>
-              <a:rPr lang="en-US" sz="3200" spc="-100" dirty="0" smtClean="0"/>
-              <a:t>Net </a:t>
-            </a:r>
-            <a:r>
               <a:rPr lang="en-US" sz="3200" spc="-100" dirty="0"/>
-              <a:t>Patient Revenue by Payer </a:t>
-            </a:r>
-            <a:r>
-              <a:rPr lang="en-US" sz="3200" spc="-100" dirty="0" smtClean="0"/>
-              <a:t>Category:</a:t>
+              <a:t>Net Patient Revenue by Payer Category:</a:t>
             </a:r>
             <a:endParaRPr lang="en-US" sz="3200" dirty="0"/>
           </a:p>
@@ -13273,132 +14357,58 @@
                   <a:srgbClr val="FFFFFF"/>
                 </a:solidFill>
               </a:rPr>
-              <a:t>The data suggests that 'Other Third Parties-Managed Care' </a:t>
+              <a:t>The data suggests that 'Other Third Parties-Managed Care' (e.g., private insurance companies, employer-sponsored health plans, or other managed care organizations) is the largest category, accounting for just over 40.09% of the composition mix. </a:t>
             </a:r>
-            <a:r>
-              <a:rPr lang="en-US" sz="1600" dirty="0" smtClean="0">
-                <a:solidFill>
-                  <a:srgbClr val="FFFFFF"/>
-                </a:solidFill>
-              </a:rPr>
-              <a:t>(e.g., private </a:t>
-            </a:r>
+          </a:p>
+          <a:p>
+            <a:endParaRPr lang="en-US" sz="1600" dirty="0">
+              <a:solidFill>
+                <a:srgbClr val="FFFFFF"/>
+              </a:solidFill>
+            </a:endParaRPr>
+          </a:p>
+          <a:p>
             <a:r>
               <a:rPr lang="en-US" sz="1600" dirty="0">
                 <a:solidFill>
                   <a:srgbClr val="FFFFFF"/>
                 </a:solidFill>
               </a:rPr>
-              <a:t>insurance companies, employer-sponsored health plans, or other managed care </a:t>
+              <a:t>Importance of Payment Mix:</a:t>
             </a:r>
-            <a:r>
-              <a:rPr lang="en-US" sz="1600" dirty="0" smtClean="0">
-                <a:solidFill>
-                  <a:srgbClr val="FFFFFF"/>
-                </a:solidFill>
-              </a:rPr>
-              <a:t>organizations) is </a:t>
-            </a:r>
+          </a:p>
+          <a:p>
             <a:r>
               <a:rPr lang="en-US" sz="1600" dirty="0">
                 <a:solidFill>
                   <a:srgbClr val="FFFFFF"/>
                 </a:solidFill>
               </a:rPr>
-              <a:t>the largest category, accounting for just over </a:t>
+              <a:t>1. Revenue Optimization</a:t>
             </a:r>
-            <a:r>
-              <a:rPr lang="en-US" sz="1600" dirty="0" smtClean="0">
-                <a:solidFill>
-                  <a:srgbClr val="FFFFFF"/>
-                </a:solidFill>
-              </a:rPr>
-              <a:t>40.09% </a:t>
-            </a:r>
+          </a:p>
+          <a:p>
             <a:r>
               <a:rPr lang="en-US" sz="1600" dirty="0">
                 <a:solidFill>
                   <a:srgbClr val="FFFFFF"/>
                 </a:solidFill>
               </a:rPr>
-              <a:t>of the composition mix. </a:t>
+              <a:t>2. Regulatory Compliance</a:t>
             </a:r>
-            <a:endParaRPr lang="en-US" sz="1600" dirty="0" smtClean="0">
-              <a:solidFill>
-                <a:srgbClr val="FFFFFF"/>
-              </a:solidFill>
-            </a:endParaRPr>
-          </a:p>
-          <a:p>
-            <a:endParaRPr lang="en-US" sz="1600" dirty="0" smtClean="0">
-              <a:solidFill>
-                <a:srgbClr val="FFFFFF"/>
-              </a:solidFill>
-            </a:endParaRPr>
-          </a:p>
-          <a:p>
-            <a:r>
-              <a:rPr lang="en-US" sz="1600" dirty="0" smtClean="0">
-                <a:solidFill>
-                  <a:srgbClr val="FFFFFF"/>
-                </a:solidFill>
-              </a:rPr>
-              <a:t>Importance of </a:t>
-            </a:r>
+          </a:p>
+          <a:p>
             <a:r>
               <a:rPr lang="en-US" sz="1600" dirty="0">
                 <a:solidFill>
                   <a:srgbClr val="FFFFFF"/>
                 </a:solidFill>
               </a:rPr>
-              <a:t>Payment </a:t>
-            </a:r>
-            <a:r>
-              <a:rPr lang="en-US" sz="1600" dirty="0" smtClean="0">
-                <a:solidFill>
-                  <a:srgbClr val="FFFFFF"/>
-                </a:solidFill>
-              </a:rPr>
-              <a:t>Mix:</a:t>
-            </a:r>
-          </a:p>
-          <a:p>
-            <a:r>
-              <a:rPr lang="en-US" sz="1600" dirty="0" smtClean="0">
-                <a:solidFill>
-                  <a:srgbClr val="FFFFFF"/>
-                </a:solidFill>
-              </a:rPr>
-              <a:t>1. Revenue Optimization</a:t>
-            </a:r>
-          </a:p>
-          <a:p>
-            <a:r>
-              <a:rPr lang="en-US" sz="1600" dirty="0" smtClean="0">
-                <a:solidFill>
-                  <a:srgbClr val="FFFFFF"/>
-                </a:solidFill>
-              </a:rPr>
-              <a:t>2. Regulatory Compliance</a:t>
-            </a:r>
-          </a:p>
-          <a:p>
-            <a:r>
-              <a:rPr lang="en-US" sz="1600" dirty="0" smtClean="0">
-                <a:solidFill>
-                  <a:srgbClr val="FFFFFF"/>
-                </a:solidFill>
-              </a:rPr>
               <a:t>3. Risk Management</a:t>
             </a:r>
+          </a:p>
+          <a:p>
             <a:endParaRPr lang="en-US" sz="1600" dirty="0">
-              <a:solidFill>
-                <a:srgbClr val="FFFFFF"/>
-              </a:solidFill>
-            </a:endParaRPr>
-          </a:p>
-          <a:p>
-            <a:endParaRPr lang="en-US" sz="1600" dirty="0" smtClean="0">
               <a:solidFill>
                 <a:srgbClr val="FFFFFF"/>
               </a:solidFill>
@@ -13440,707 +14450,6 @@
     <p:extLst>
       <p:ext uri="{BB962C8B-B14F-4D97-AF65-F5344CB8AC3E}">
         <p14:creationId xmlns:p14="http://schemas.microsoft.com/office/powerpoint/2010/main" val="355635710"/>
-      </p:ext>
-    </p:extLst>
-  </p:cSld>
-  <p:clrMapOvr>
-    <a:masterClrMapping/>
-  </p:clrMapOvr>
-</p:sld>
-</file>
-
-<file path=ppt/slides/slide8.xml><?xml version="1.0" encoding="utf-8"?>
-<p:sld xmlns:a="http://schemas.openxmlformats.org/drawingml/2006/main" xmlns:r="http://schemas.openxmlformats.org/officeDocument/2006/relationships" xmlns:p="http://schemas.openxmlformats.org/presentationml/2006/main">
-  <p:cSld>
-    <p:bg>
-      <p:bgPr>
-        <a:solidFill>
-          <a:schemeClr val="bg1"/>
-        </a:solidFill>
-        <a:effectLst/>
-      </p:bgPr>
-    </p:bg>
-    <p:spTree>
-      <p:nvGrpSpPr>
-        <p:cNvPr id="1" name=""/>
-        <p:cNvGrpSpPr/>
-        <p:nvPr/>
-      </p:nvGrpSpPr>
-      <p:grpSpPr>
-        <a:xfrm>
-          <a:off x="0" y="0"/>
-          <a:ext cx="0" cy="0"/>
-          <a:chOff x="0" y="0"/>
-          <a:chExt cx="0" cy="0"/>
-        </a:xfrm>
-      </p:grpSpPr>
-      <p:sp>
-        <p:nvSpPr>
-          <p:cNvPr id="11" name="Rectangle 10">
-            <a:extLst>
-              <a:ext uri="{FF2B5EF4-FFF2-40B4-BE49-F238E27FC236}">
-                <a16:creationId xmlns:a16="http://schemas.microsoft.com/office/drawing/2014/main" id="{64C9EE1D-12BB-43F7-9A2A-893578DCA63A}"/>
-              </a:ext>
-              <a:ext uri="{C183D7F6-B498-43B3-948B-1728B52AA6E4}">
-                <adec:decorative xmlns:adec="http://schemas.microsoft.com/office/drawing/2017/decorative" xmlns="" val="1"/>
-              </a:ext>
-            </a:extLst>
-          </p:cNvPr>
-          <p:cNvSpPr>
-            <a:spLocks noGrp="1" noRot="1" noChangeAspect="1" noMove="1" noResize="1" noEditPoints="1" noAdjustHandles="1" noChangeArrowheads="1" noChangeShapeType="1" noTextEdit="1"/>
-          </p:cNvSpPr>
-          <p:nvPr>
-            <p:extLst>
-              <p:ext uri="{386F3935-93C4-4BCD-93E2-E3B085C9AB24}">
-                <p16:designElem xmlns:p16="http://schemas.microsoft.com/office/powerpoint/2015/main" val="1"/>
-              </p:ext>
-            </p:extLst>
-          </p:nvPr>
-        </p:nvSpPr>
-        <p:spPr>
-          <a:xfrm>
-            <a:off x="0" y="761999"/>
-            <a:ext cx="9141619" cy="5334001"/>
-          </a:xfrm>
-          <a:prstGeom prst="rect">
-            <a:avLst/>
-          </a:prstGeom>
-          <a:solidFill>
-            <a:schemeClr val="accent1"/>
-          </a:solidFill>
-          <a:ln>
-            <a:noFill/>
-          </a:ln>
-        </p:spPr>
-        <p:style>
-          <a:lnRef idx="2">
-            <a:schemeClr val="accent1">
-              <a:shade val="50000"/>
-            </a:schemeClr>
-          </a:lnRef>
-          <a:fillRef idx="1">
-            <a:schemeClr val="accent1"/>
-          </a:fillRef>
-          <a:effectRef idx="0">
-            <a:schemeClr val="accent1"/>
-          </a:effectRef>
-          <a:fontRef idx="minor">
-            <a:schemeClr val="lt1"/>
-          </a:fontRef>
-        </p:style>
-        <p:txBody>
-          <a:bodyPr/>
-          <a:lstStyle/>
-          <a:p>
-            <a:endParaRPr lang="en-US"/>
-          </a:p>
-        </p:txBody>
-      </p:sp>
-      <p:sp>
-        <p:nvSpPr>
-          <p:cNvPr id="13" name="Rectangle 12">
-            <a:extLst>
-              <a:ext uri="{FF2B5EF4-FFF2-40B4-BE49-F238E27FC236}">
-                <a16:creationId xmlns:a16="http://schemas.microsoft.com/office/drawing/2014/main" id="{43962A31-C54E-4762-B155-59777FED1C75}"/>
-              </a:ext>
-              <a:ext uri="{C183D7F6-B498-43B3-948B-1728B52AA6E4}">
-                <adec:decorative xmlns:adec="http://schemas.microsoft.com/office/drawing/2017/decorative" xmlns="" val="1"/>
-              </a:ext>
-            </a:extLst>
-          </p:cNvPr>
-          <p:cNvSpPr>
-            <a:spLocks noGrp="1" noRot="1" noChangeAspect="1" noMove="1" noResize="1" noEditPoints="1" noAdjustHandles="1" noChangeArrowheads="1" noChangeShapeType="1" noTextEdit="1"/>
-          </p:cNvSpPr>
-          <p:nvPr>
-            <p:extLst>
-              <p:ext uri="{386F3935-93C4-4BCD-93E2-E3B085C9AB24}">
-                <p16:designElem xmlns:p16="http://schemas.microsoft.com/office/powerpoint/2015/main" val="1"/>
-              </p:ext>
-            </p:extLst>
-          </p:nvPr>
-        </p:nvSpPr>
-        <p:spPr>
-          <a:xfrm>
-            <a:off x="9270263" y="761999"/>
-            <a:ext cx="2925318" cy="5334001"/>
-          </a:xfrm>
-          <a:prstGeom prst="rect">
-            <a:avLst/>
-          </a:prstGeom>
-          <a:solidFill>
-            <a:srgbClr val="C8C8C8">
-              <a:alpha val="49804"/>
-            </a:srgbClr>
-          </a:solidFill>
-          <a:ln>
-            <a:noFill/>
-          </a:ln>
-        </p:spPr>
-        <p:style>
-          <a:lnRef idx="2">
-            <a:schemeClr val="accent1">
-              <a:shade val="50000"/>
-            </a:schemeClr>
-          </a:lnRef>
-          <a:fillRef idx="1">
-            <a:schemeClr val="accent1"/>
-          </a:fillRef>
-          <a:effectRef idx="0">
-            <a:schemeClr val="accent1"/>
-          </a:effectRef>
-          <a:fontRef idx="minor">
-            <a:schemeClr val="lt1"/>
-          </a:fontRef>
-        </p:style>
-        <p:txBody>
-          <a:bodyPr/>
-          <a:lstStyle/>
-          <a:p>
-            <a:endParaRPr lang="en-US"/>
-          </a:p>
-        </p:txBody>
-      </p:sp>
-      <p:sp useBgFill="1">
-        <p:nvSpPr>
-          <p:cNvPr id="15" name="Rectangle 14">
-            <a:extLst>
-              <a:ext uri="{FF2B5EF4-FFF2-40B4-BE49-F238E27FC236}">
-                <a16:creationId xmlns:a16="http://schemas.microsoft.com/office/drawing/2014/main" id="{4B392D36-B685-45E0-B197-6EE5D748093B}"/>
-              </a:ext>
-              <a:ext uri="{C183D7F6-B498-43B3-948B-1728B52AA6E4}">
-                <adec:decorative xmlns:adec="http://schemas.microsoft.com/office/drawing/2017/decorative" xmlns="" val="1"/>
-              </a:ext>
-            </a:extLst>
-          </p:cNvPr>
-          <p:cNvSpPr>
-            <a:spLocks noGrp="1" noRot="1" noChangeAspect="1" noMove="1" noResize="1" noEditPoints="1" noAdjustHandles="1" noChangeArrowheads="1" noChangeShapeType="1" noTextEdit="1"/>
-          </p:cNvSpPr>
-          <p:nvPr>
-            <p:extLst>
-              <p:ext uri="{386F3935-93C4-4BCD-93E2-E3B085C9AB24}">
-                <p16:designElem xmlns:p16="http://schemas.microsoft.com/office/powerpoint/2015/main" val="1"/>
-              </p:ext>
-            </p:extLst>
-          </p:nvPr>
-        </p:nvSpPr>
-        <p:spPr>
-          <a:xfrm>
-            <a:off x="0" y="0"/>
-            <a:ext cx="12191999" cy="6858000"/>
-          </a:xfrm>
-          <a:prstGeom prst="rect">
-            <a:avLst/>
-          </a:prstGeom>
-          <a:ln>
-            <a:noFill/>
-          </a:ln>
-        </p:spPr>
-        <p:style>
-          <a:lnRef idx="2">
-            <a:schemeClr val="accent1">
-              <a:shade val="50000"/>
-            </a:schemeClr>
-          </a:lnRef>
-          <a:fillRef idx="1">
-            <a:schemeClr val="accent1"/>
-          </a:fillRef>
-          <a:effectRef idx="0">
-            <a:schemeClr val="accent1"/>
-          </a:effectRef>
-          <a:fontRef idx="minor">
-            <a:schemeClr val="lt1"/>
-          </a:fontRef>
-        </p:style>
-        <p:txBody>
-          <a:bodyPr rtlCol="0" anchor="ctr"/>
-          <a:lstStyle/>
-          <a:p>
-            <a:pPr algn="ctr"/>
-            <a:endParaRPr lang="en-US"/>
-          </a:p>
-        </p:txBody>
-      </p:sp>
-      <p:sp>
-        <p:nvSpPr>
-          <p:cNvPr id="17" name="Rectangle 16">
-            <a:extLst>
-              <a:ext uri="{FF2B5EF4-FFF2-40B4-BE49-F238E27FC236}">
-                <a16:creationId xmlns:a16="http://schemas.microsoft.com/office/drawing/2014/main" id="{9DCA8533-CC5E-4754-9A04-047EDE49E0F9}"/>
-              </a:ext>
-              <a:ext uri="{C183D7F6-B498-43B3-948B-1728B52AA6E4}">
-                <adec:decorative xmlns:adec="http://schemas.microsoft.com/office/drawing/2017/decorative" xmlns="" val="1"/>
-              </a:ext>
-            </a:extLst>
-          </p:cNvPr>
-          <p:cNvSpPr>
-            <a:spLocks noGrp="1" noRot="1" noChangeAspect="1" noMove="1" noResize="1" noEditPoints="1" noAdjustHandles="1" noChangeArrowheads="1" noChangeShapeType="1" noTextEdit="1"/>
-          </p:cNvSpPr>
-          <p:nvPr>
-            <p:extLst>
-              <p:ext uri="{386F3935-93C4-4BCD-93E2-E3B085C9AB24}">
-                <p16:designElem xmlns:p16="http://schemas.microsoft.com/office/powerpoint/2015/main" val="1"/>
-              </p:ext>
-            </p:extLst>
-          </p:nvPr>
-        </p:nvSpPr>
-        <p:spPr>
-          <a:xfrm>
-            <a:off x="0" y="4367639"/>
-            <a:ext cx="11707367" cy="1852186"/>
-          </a:xfrm>
-          <a:prstGeom prst="rect">
-            <a:avLst/>
-          </a:prstGeom>
-          <a:solidFill>
-            <a:schemeClr val="accent1"/>
-          </a:solidFill>
-          <a:ln>
-            <a:noFill/>
-          </a:ln>
-        </p:spPr>
-        <p:style>
-          <a:lnRef idx="2">
-            <a:schemeClr val="accent1">
-              <a:shade val="50000"/>
-            </a:schemeClr>
-          </a:lnRef>
-          <a:fillRef idx="1">
-            <a:schemeClr val="accent1"/>
-          </a:fillRef>
-          <a:effectRef idx="0">
-            <a:schemeClr val="accent1"/>
-          </a:effectRef>
-          <a:fontRef idx="minor">
-            <a:schemeClr val="lt1"/>
-          </a:fontRef>
-        </p:style>
-        <p:txBody>
-          <a:bodyPr/>
-          <a:lstStyle/>
-          <a:p>
-            <a:endParaRPr lang="en-US"/>
-          </a:p>
-        </p:txBody>
-      </p:sp>
-      <p:sp>
-        <p:nvSpPr>
-          <p:cNvPr id="2" name="Title 1">
-            <a:extLst>
-              <a:ext uri="{FF2B5EF4-FFF2-40B4-BE49-F238E27FC236}">
-                <a16:creationId xmlns:a16="http://schemas.microsoft.com/office/drawing/2014/main" id="{42DDEF5E-97CF-67AD-61E7-5031AE23B6A0}"/>
-              </a:ext>
-            </a:extLst>
-          </p:cNvPr>
-          <p:cNvSpPr>
-            <a:spLocks noGrp="1"/>
-          </p:cNvSpPr>
-          <p:nvPr>
-            <p:ph type="title"/>
-          </p:nvPr>
-        </p:nvSpPr>
-        <p:spPr>
-          <a:xfrm>
-            <a:off x="1069848" y="4590661"/>
-            <a:ext cx="10210862" cy="1065690"/>
-          </a:xfrm>
-        </p:spPr>
-        <p:txBody>
-          <a:bodyPr vert="horz" lIns="91440" tIns="45720" rIns="91440" bIns="45720" rtlCol="0" anchor="b">
-            <a:normAutofit/>
-          </a:bodyPr>
-          <a:lstStyle/>
-          <a:p>
-            <a:r>
-              <a:rPr lang="en-US" sz="5000" spc="-100" dirty="0"/>
-              <a:t>Net Patient Revenue by Payer Category</a:t>
-            </a:r>
-          </a:p>
-        </p:txBody>
-      </p:sp>
-      <p:pic>
-        <p:nvPicPr>
-          <p:cNvPr id="6" name="Picture 5">
-            <a:extLst>
-              <a:ext uri="{FF2B5EF4-FFF2-40B4-BE49-F238E27FC236}">
-                <a16:creationId xmlns:a16="http://schemas.microsoft.com/office/drawing/2014/main" id="{1DE17641-4937-3F7E-4890-F0E6B17DE326}"/>
-              </a:ext>
-            </a:extLst>
-          </p:cNvPr>
-          <p:cNvPicPr>
-            <a:picLocks noChangeAspect="1"/>
-          </p:cNvPicPr>
-          <p:nvPr/>
-        </p:nvPicPr>
-        <p:blipFill>
-          <a:blip r:embed="rId2">
-            <a:extLst>
-              <a:ext uri="{28A0092B-C50C-407E-A947-70E740481C1C}">
-                <a14:useLocalDpi xmlns:a14="http://schemas.microsoft.com/office/drawing/2010/main" val="0"/>
-              </a:ext>
-            </a:extLst>
-          </a:blip>
-          <a:stretch>
-            <a:fillRect/>
-          </a:stretch>
-        </p:blipFill>
-        <p:spPr>
-          <a:xfrm>
-            <a:off x="303959" y="727252"/>
-            <a:ext cx="5730399" cy="2936830"/>
-          </a:xfrm>
-          <a:prstGeom prst="rect">
-            <a:avLst/>
-          </a:prstGeom>
-        </p:spPr>
-      </p:pic>
-      <p:pic>
-        <p:nvPicPr>
-          <p:cNvPr id="4" name="Picture 3">
-            <a:extLst>
-              <a:ext uri="{FF2B5EF4-FFF2-40B4-BE49-F238E27FC236}">
-                <a16:creationId xmlns:a16="http://schemas.microsoft.com/office/drawing/2014/main" id="{A7BC05BB-32B4-015B-27E1-A92762543004}"/>
-              </a:ext>
-            </a:extLst>
-          </p:cNvPr>
-          <p:cNvPicPr>
-            <a:picLocks noChangeAspect="1"/>
-          </p:cNvPicPr>
-          <p:nvPr/>
-        </p:nvPicPr>
-        <p:blipFill>
-          <a:blip r:embed="rId3"/>
-          <a:stretch>
-            <a:fillRect/>
-          </a:stretch>
-        </p:blipFill>
-        <p:spPr>
-          <a:xfrm>
-            <a:off x="6338317" y="923364"/>
-            <a:ext cx="4789992" cy="2802145"/>
-          </a:xfrm>
-          <a:prstGeom prst="rect">
-            <a:avLst/>
-          </a:prstGeom>
-        </p:spPr>
-      </p:pic>
-    </p:spTree>
-    <p:extLst>
-      <p:ext uri="{BB962C8B-B14F-4D97-AF65-F5344CB8AC3E}">
-        <p14:creationId xmlns:p14="http://schemas.microsoft.com/office/powerpoint/2010/main" val="73709696"/>
-      </p:ext>
-    </p:extLst>
-  </p:cSld>
-  <p:clrMapOvr>
-    <a:masterClrMapping/>
-  </p:clrMapOvr>
-</p:sld>
-</file>
-
-<file path=ppt/slides/slide9.xml><?xml version="1.0" encoding="utf-8"?>
-<p:sld xmlns:a="http://schemas.openxmlformats.org/drawingml/2006/main" xmlns:r="http://schemas.openxmlformats.org/officeDocument/2006/relationships" xmlns:p="http://schemas.openxmlformats.org/presentationml/2006/main">
-  <p:cSld>
-    <p:bg>
-      <p:bgPr>
-        <a:solidFill>
-          <a:schemeClr val="bg1"/>
-        </a:solidFill>
-        <a:effectLst/>
-      </p:bgPr>
-    </p:bg>
-    <p:spTree>
-      <p:nvGrpSpPr>
-        <p:cNvPr id="1" name=""/>
-        <p:cNvGrpSpPr/>
-        <p:nvPr/>
-      </p:nvGrpSpPr>
-      <p:grpSpPr>
-        <a:xfrm>
-          <a:off x="0" y="0"/>
-          <a:ext cx="0" cy="0"/>
-          <a:chOff x="0" y="0"/>
-          <a:chExt cx="0" cy="0"/>
-        </a:xfrm>
-      </p:grpSpPr>
-      <p:sp>
-        <p:nvSpPr>
-          <p:cNvPr id="10" name="Rectangle 9">
-            <a:extLst>
-              <a:ext uri="{FF2B5EF4-FFF2-40B4-BE49-F238E27FC236}">
-                <a16:creationId xmlns:a16="http://schemas.microsoft.com/office/drawing/2014/main" id="{681577AD-DA5F-48B3-8FB9-5199BA9EE681}"/>
-              </a:ext>
-              <a:ext uri="{C183D7F6-B498-43B3-948B-1728B52AA6E4}">
-                <adec:decorative xmlns:adec="http://schemas.microsoft.com/office/drawing/2017/decorative" xmlns="" val="1"/>
-              </a:ext>
-            </a:extLst>
-          </p:cNvPr>
-          <p:cNvSpPr>
-            <a:spLocks noGrp="1" noRot="1" noChangeAspect="1" noMove="1" noResize="1" noEditPoints="1" noAdjustHandles="1" noChangeArrowheads="1" noChangeShapeType="1" noTextEdit="1"/>
-          </p:cNvSpPr>
-          <p:nvPr>
-            <p:extLst>
-              <p:ext uri="{386F3935-93C4-4BCD-93E2-E3B085C9AB24}">
-                <p16:designElem xmlns:p16="http://schemas.microsoft.com/office/powerpoint/2015/main" val="1"/>
-              </p:ext>
-            </p:extLst>
-          </p:nvPr>
-        </p:nvSpPr>
-        <p:spPr>
-          <a:xfrm>
-            <a:off x="1" y="765350"/>
-            <a:ext cx="4642228" cy="5330650"/>
-          </a:xfrm>
-          <a:prstGeom prst="rect">
-            <a:avLst/>
-          </a:prstGeom>
-          <a:solidFill>
-            <a:schemeClr val="accent1"/>
-          </a:solidFill>
-          <a:ln>
-            <a:noFill/>
-          </a:ln>
-        </p:spPr>
-        <p:style>
-          <a:lnRef idx="2">
-            <a:schemeClr val="accent1">
-              <a:shade val="50000"/>
-            </a:schemeClr>
-          </a:lnRef>
-          <a:fillRef idx="1">
-            <a:schemeClr val="accent1"/>
-          </a:fillRef>
-          <a:effectRef idx="0">
-            <a:schemeClr val="accent1"/>
-          </a:effectRef>
-          <a:fontRef idx="minor">
-            <a:schemeClr val="lt1"/>
-          </a:fontRef>
-        </p:style>
-        <p:txBody>
-          <a:bodyPr/>
-          <a:lstStyle/>
-          <a:p>
-            <a:endParaRPr lang="en-US"/>
-          </a:p>
-        </p:txBody>
-      </p:sp>
-      <p:sp>
-        <p:nvSpPr>
-          <p:cNvPr id="2" name="Title 1">
-            <a:extLst>
-              <a:ext uri="{FF2B5EF4-FFF2-40B4-BE49-F238E27FC236}">
-                <a16:creationId xmlns:a16="http://schemas.microsoft.com/office/drawing/2014/main" id="{006AEA51-05B8-7657-CD71-E43E34445B2B}"/>
-              </a:ext>
-            </a:extLst>
-          </p:cNvPr>
-          <p:cNvSpPr>
-            <a:spLocks noGrp="1"/>
-          </p:cNvSpPr>
-          <p:nvPr>
-            <p:ph type="title"/>
-          </p:nvPr>
-        </p:nvSpPr>
-        <p:spPr>
-          <a:xfrm>
-            <a:off x="289249" y="1123837"/>
-            <a:ext cx="4016116" cy="1255469"/>
-          </a:xfrm>
-        </p:spPr>
-        <p:txBody>
-          <a:bodyPr>
-            <a:normAutofit/>
-          </a:bodyPr>
-          <a:lstStyle/>
-          <a:p>
-            <a:r>
-              <a:rPr lang="en-US" dirty="0"/>
-              <a:t>Type of Care</a:t>
-            </a:r>
-          </a:p>
-        </p:txBody>
-      </p:sp>
-      <p:sp>
-        <p:nvSpPr>
-          <p:cNvPr id="3" name="Content Placeholder 2">
-            <a:extLst>
-              <a:ext uri="{FF2B5EF4-FFF2-40B4-BE49-F238E27FC236}">
-                <a16:creationId xmlns:a16="http://schemas.microsoft.com/office/drawing/2014/main" id="{823EF9F2-09E6-EDD1-080B-B22A4AA63FE0}"/>
-              </a:ext>
-            </a:extLst>
-          </p:cNvPr>
-          <p:cNvSpPr>
-            <a:spLocks noGrp="1"/>
-          </p:cNvSpPr>
-          <p:nvPr>
-            <p:ph idx="1"/>
-          </p:nvPr>
-        </p:nvSpPr>
-        <p:spPr>
-          <a:xfrm>
-            <a:off x="289249" y="2510395"/>
-            <a:ext cx="4016116" cy="3274586"/>
-          </a:xfrm>
-        </p:spPr>
-        <p:txBody>
-          <a:bodyPr anchor="t">
-            <a:normAutofit/>
-          </a:bodyPr>
-          <a:lstStyle/>
-          <a:p>
-            <a:r>
-              <a:rPr lang="en-US">
-                <a:solidFill>
-                  <a:srgbClr val="FFFFFF"/>
-                </a:solidFill>
-              </a:rPr>
-              <a:t>The type of care provided at each hospital varied. For most hospitals, the majority of care provided fell under Acute Care – which includes services like medical/surgical acute, obstetrics acute, definitive observation, medical/surgical intensive care, and coronary care.</a:t>
-            </a:r>
-          </a:p>
-        </p:txBody>
-      </p:sp>
-      <p:pic>
-        <p:nvPicPr>
-          <p:cNvPr id="5" name="Picture 4">
-            <a:extLst>
-              <a:ext uri="{FF2B5EF4-FFF2-40B4-BE49-F238E27FC236}">
-                <a16:creationId xmlns:a16="http://schemas.microsoft.com/office/drawing/2014/main" id="{0852B3FF-D1E9-2ABC-74E5-ACEBBDDFE0D0}"/>
-              </a:ext>
-            </a:extLst>
-          </p:cNvPr>
-          <p:cNvPicPr>
-            <a:picLocks noChangeAspect="1"/>
-          </p:cNvPicPr>
-          <p:nvPr/>
-        </p:nvPicPr>
-        <p:blipFill>
-          <a:blip r:embed="rId2">
-            <a:extLst>
-              <a:ext uri="{28A0092B-C50C-407E-A947-70E740481C1C}">
-                <a14:useLocalDpi xmlns:a14="http://schemas.microsoft.com/office/drawing/2010/main" val="0"/>
-              </a:ext>
-            </a:extLst>
-          </a:blip>
-          <a:srcRect/>
-          <a:stretch/>
-        </p:blipFill>
-        <p:spPr>
-          <a:xfrm>
-            <a:off x="5137462" y="675257"/>
-            <a:ext cx="6193767" cy="2663649"/>
-          </a:xfrm>
-          <a:prstGeom prst="rect">
-            <a:avLst/>
-          </a:prstGeom>
-          <a:ln>
-            <a:solidFill>
-              <a:schemeClr val="accent2"/>
-            </a:solidFill>
-          </a:ln>
-        </p:spPr>
-      </p:pic>
-      <p:pic>
-        <p:nvPicPr>
-          <p:cNvPr id="7" name="Picture 6">
-            <a:extLst>
-              <a:ext uri="{FF2B5EF4-FFF2-40B4-BE49-F238E27FC236}">
-                <a16:creationId xmlns:a16="http://schemas.microsoft.com/office/drawing/2014/main" id="{4A3001BC-2BA8-E361-1B49-1994C651D223}"/>
-              </a:ext>
-            </a:extLst>
-          </p:cNvPr>
-          <p:cNvPicPr>
-            <a:picLocks noChangeAspect="1"/>
-          </p:cNvPicPr>
-          <p:nvPr/>
-        </p:nvPicPr>
-        <p:blipFill>
-          <a:blip r:embed="rId3">
-            <a:extLst>
-              <a:ext uri="{28A0092B-C50C-407E-A947-70E740481C1C}">
-                <a14:useLocalDpi xmlns:a14="http://schemas.microsoft.com/office/drawing/2010/main" val="0"/>
-              </a:ext>
-            </a:extLst>
-          </a:blip>
-          <a:srcRect/>
-          <a:stretch/>
-        </p:blipFill>
-        <p:spPr>
-          <a:xfrm>
-            <a:off x="5137462" y="3671275"/>
-            <a:ext cx="6209800" cy="2663648"/>
-          </a:xfrm>
-          <a:prstGeom prst="rect">
-            <a:avLst/>
-          </a:prstGeom>
-          <a:ln>
-            <a:solidFill>
-              <a:schemeClr val="accent3"/>
-            </a:solidFill>
-          </a:ln>
-        </p:spPr>
-      </p:pic>
-      <p:pic>
-        <p:nvPicPr>
-          <p:cNvPr id="12" name="Picture 11">
-            <a:extLst>
-              <a:ext uri="{FF2B5EF4-FFF2-40B4-BE49-F238E27FC236}">
-                <a16:creationId xmlns:a16="http://schemas.microsoft.com/office/drawing/2014/main" id="{6785A70A-F2A2-A824-FD86-36DD23075ADB}"/>
-              </a:ext>
-            </a:extLst>
-          </p:cNvPr>
-          <p:cNvPicPr>
-            <a:picLocks noChangeAspect="1"/>
-          </p:cNvPicPr>
-          <p:nvPr/>
-        </p:nvPicPr>
-        <p:blipFill>
-          <a:blip r:embed="rId4"/>
-          <a:stretch>
-            <a:fillRect/>
-          </a:stretch>
-        </p:blipFill>
-        <p:spPr>
-          <a:xfrm>
-            <a:off x="5152704" y="3442033"/>
-            <a:ext cx="4884843" cy="175275"/>
-          </a:xfrm>
-          <a:prstGeom prst="rect">
-            <a:avLst/>
-          </a:prstGeom>
-        </p:spPr>
-      </p:pic>
-      <p:pic>
-        <p:nvPicPr>
-          <p:cNvPr id="14" name="Picture 13">
-            <a:extLst>
-              <a:ext uri="{FF2B5EF4-FFF2-40B4-BE49-F238E27FC236}">
-                <a16:creationId xmlns:a16="http://schemas.microsoft.com/office/drawing/2014/main" id="{3A813C7B-52D2-C89C-B4C6-2B68A97C066D}"/>
-              </a:ext>
-            </a:extLst>
-          </p:cNvPr>
-          <p:cNvPicPr>
-            <a:picLocks noChangeAspect="1"/>
-          </p:cNvPicPr>
-          <p:nvPr/>
-        </p:nvPicPr>
-        <p:blipFill>
-          <a:blip r:embed="rId5"/>
-          <a:stretch>
-            <a:fillRect/>
-          </a:stretch>
-        </p:blipFill>
-        <p:spPr>
-          <a:xfrm>
-            <a:off x="5137462" y="438528"/>
-            <a:ext cx="4884843" cy="190517"/>
-          </a:xfrm>
-          <a:prstGeom prst="rect">
-            <a:avLst/>
-          </a:prstGeom>
-        </p:spPr>
-      </p:pic>
-    </p:spTree>
-    <p:extLst>
-      <p:ext uri="{BB962C8B-B14F-4D97-AF65-F5344CB8AC3E}">
-        <p14:creationId xmlns:p14="http://schemas.microsoft.com/office/powerpoint/2010/main" val="2222846450"/>
       </p:ext>
     </p:extLst>
   </p:cSld>

</xml_diff>